<commit_message>
Update GBADs Ethiopia AHLE and attribution code overview.pptx
</commit_message>
<xml_diff>
--- a/Ethiopia Workspace/Documentation/GBADs Ethiopia AHLE and attribution code overview.pptx
+++ b/Ethiopia Workspace/Documentation/GBADs Ethiopia AHLE and attribution code overview.pptx
@@ -7,11 +7,15 @@
     <p:sldMasterId id="2147483688" r:id="rId6"/>
   </p:sldMasterIdLst>
   <p:notesMasterIdLst>
-    <p:notesMasterId r:id="rId9"/>
+    <p:notesMasterId r:id="rId13"/>
   </p:notesMasterIdLst>
   <p:sldIdLst>
     <p:sldId id="256" r:id="rId7"/>
     <p:sldId id="257" r:id="rId8"/>
+    <p:sldId id="258" r:id="rId9"/>
+    <p:sldId id="261" r:id="rId10"/>
+    <p:sldId id="259" r:id="rId11"/>
+    <p:sldId id="260" r:id="rId12"/>
   </p:sldIdLst>
   <p:sldSz cx="12192000" cy="6858000"/>
   <p:notesSz cx="6858000" cy="9144000"/>
@@ -214,7 +218,7 @@
           <a:p>
             <a:fld id="{B2714213-9BB5-453D-948D-9A1A8ECD5C5B}" type="datetimeFigureOut">
               <a:rPr lang="en-US" smtClean="0"/>
-              <a:t>1/11/2023</a:t>
+              <a:t>1/18/2023</a:t>
             </a:fld>
             <a:endParaRPr lang="en-US"/>
           </a:p>
@@ -4200,13 +4204,13 @@
         </p:nvSpPr>
         <p:spPr>
           <a:xfrm>
-            <a:off x="303276" y="5921983"/>
-            <a:ext cx="11585448" cy="652929"/>
+            <a:off x="303276" y="6118148"/>
+            <a:ext cx="11585448" cy="355489"/>
           </a:xfrm>
         </p:spPr>
         <p:txBody>
           <a:bodyPr>
-            <a:normAutofit fontScale="92500" lnSpcReduction="10000"/>
+            <a:normAutofit/>
           </a:bodyPr>
           <a:lstStyle/>
           <a:p>
@@ -4235,18 +4239,7 @@
             </a:r>
             <a:r>
               <a:rPr lang="en-US" sz="1400" dirty="0"/>
-              <a:t>)</a:t>
-            </a:r>
-          </a:p>
-          <a:p>
-            <a:pPr>
-              <a:lnSpc>
-                <a:spcPct val="110000"/>
-              </a:lnSpc>
-            </a:pPr>
-            <a:r>
-              <a:rPr lang="en-US" sz="1400" dirty="0"/>
-              <a:t>Ethiopia Workspace folder</a:t>
+              <a:t>), Ethiopia Workspace folder</a:t>
             </a:r>
           </a:p>
         </p:txBody>
@@ -6539,6 +6532,1342 @@
     <p:extLst>
       <p:ext uri="{BB962C8B-B14F-4D97-AF65-F5344CB8AC3E}">
         <p14:creationId xmlns:p14="http://schemas.microsoft.com/office/powerpoint/2010/main" val="4262685941"/>
+      </p:ext>
+    </p:extLst>
+  </p:cSld>
+  <p:clrMapOvr>
+    <a:masterClrMapping/>
+  </p:clrMapOvr>
+</p:sld>
+</file>
+
+<file path=ppt/slides/slide3.xml><?xml version="1.0" encoding="utf-8"?>
+<p:sld xmlns:a="http://schemas.openxmlformats.org/drawingml/2006/main" xmlns:r="http://schemas.openxmlformats.org/officeDocument/2006/relationships" xmlns:p="http://schemas.openxmlformats.org/presentationml/2006/main">
+  <p:cSld>
+    <p:spTree>
+      <p:nvGrpSpPr>
+        <p:cNvPr id="1" name=""/>
+        <p:cNvGrpSpPr/>
+        <p:nvPr/>
+      </p:nvGrpSpPr>
+      <p:grpSpPr>
+        <a:xfrm>
+          <a:off x="0" y="0"/>
+          <a:ext cx="0" cy="0"/>
+          <a:chOff x="0" y="0"/>
+          <a:chExt cx="0" cy="0"/>
+        </a:xfrm>
+      </p:grpSpPr>
+      <p:sp>
+        <p:nvSpPr>
+          <p:cNvPr id="2" name="Title 1">
+            <a:extLst>
+              <a:ext uri="{FF2B5EF4-FFF2-40B4-BE49-F238E27FC236}">
+                <a16:creationId xmlns:a16="http://schemas.microsoft.com/office/drawing/2014/main" id="{7736A137-3CBB-0876-2668-129E8352CA8A}"/>
+              </a:ext>
+            </a:extLst>
+          </p:cNvPr>
+          <p:cNvSpPr>
+            <a:spLocks noGrp="1"/>
+          </p:cNvSpPr>
+          <p:nvPr>
+            <p:ph type="title"/>
+          </p:nvPr>
+        </p:nvSpPr>
+        <p:spPr/>
+        <p:txBody>
+          <a:bodyPr>
+            <a:normAutofit/>
+          </a:bodyPr>
+          <a:lstStyle/>
+          <a:p>
+            <a:r>
+              <a:rPr lang="en-US" dirty="0"/>
+              <a:t>Scenario parameters and outputs</a:t>
+            </a:r>
+          </a:p>
+        </p:txBody>
+      </p:sp>
+      <p:pic>
+        <p:nvPicPr>
+          <p:cNvPr id="7" name="Picture 6">
+            <a:extLst>
+              <a:ext uri="{FF2B5EF4-FFF2-40B4-BE49-F238E27FC236}">
+                <a16:creationId xmlns:a16="http://schemas.microsoft.com/office/drawing/2014/main" id="{17EC3D9A-8BAE-E8FE-0698-7E5BC1F72CE2}"/>
+              </a:ext>
+            </a:extLst>
+          </p:cNvPr>
+          <p:cNvPicPr>
+            <a:picLocks noChangeAspect="1"/>
+          </p:cNvPicPr>
+          <p:nvPr/>
+        </p:nvPicPr>
+        <p:blipFill>
+          <a:blip r:embed="rId2"/>
+          <a:stretch>
+            <a:fillRect/>
+          </a:stretch>
+        </p:blipFill>
+        <p:spPr>
+          <a:xfrm>
+            <a:off x="280377" y="1447910"/>
+            <a:ext cx="4545454" cy="2666890"/>
+          </a:xfrm>
+          <a:prstGeom prst="rect">
+            <a:avLst/>
+          </a:prstGeom>
+        </p:spPr>
+      </p:pic>
+      <p:sp>
+        <p:nvSpPr>
+          <p:cNvPr id="11" name="TextBox 10">
+            <a:extLst>
+              <a:ext uri="{FF2B5EF4-FFF2-40B4-BE49-F238E27FC236}">
+                <a16:creationId xmlns:a16="http://schemas.microsoft.com/office/drawing/2014/main" id="{A71E094C-AF5E-946A-5C08-68A1DEFFB223}"/>
+              </a:ext>
+            </a:extLst>
+          </p:cNvPr>
+          <p:cNvSpPr txBox="1"/>
+          <p:nvPr/>
+        </p:nvSpPr>
+        <p:spPr>
+          <a:xfrm>
+            <a:off x="280377" y="974160"/>
+            <a:ext cx="3803943" cy="369332"/>
+          </a:xfrm>
+          <a:prstGeom prst="rect">
+            <a:avLst/>
+          </a:prstGeom>
+          <a:noFill/>
+        </p:spPr>
+        <p:txBody>
+          <a:bodyPr wrap="square" rtlCol="0">
+            <a:spAutoFit/>
+          </a:bodyPr>
+          <a:lstStyle/>
+          <a:p>
+            <a:r>
+              <a:rPr lang="en-US" dirty="0"/>
+              <a:t>AHLE scenario parameters.xlsx</a:t>
+            </a:r>
+          </a:p>
+        </p:txBody>
+      </p:sp>
+      <p:pic>
+        <p:nvPicPr>
+          <p:cNvPr id="13" name="Picture 12">
+            <a:extLst>
+              <a:ext uri="{FF2B5EF4-FFF2-40B4-BE49-F238E27FC236}">
+                <a16:creationId xmlns:a16="http://schemas.microsoft.com/office/drawing/2014/main" id="{DBAE57D5-748D-B3D1-27E4-B0CE3280F388}"/>
+              </a:ext>
+            </a:extLst>
+          </p:cNvPr>
+          <p:cNvPicPr>
+            <a:picLocks noChangeAspect="1"/>
+          </p:cNvPicPr>
+          <p:nvPr/>
+        </p:nvPicPr>
+        <p:blipFill>
+          <a:blip r:embed="rId3"/>
+          <a:stretch>
+            <a:fillRect/>
+          </a:stretch>
+        </p:blipFill>
+        <p:spPr>
+          <a:xfrm>
+            <a:off x="7039317" y="1447910"/>
+            <a:ext cx="4047783" cy="2090222"/>
+          </a:xfrm>
+          <a:prstGeom prst="rect">
+            <a:avLst/>
+          </a:prstGeom>
+        </p:spPr>
+      </p:pic>
+      <p:sp>
+        <p:nvSpPr>
+          <p:cNvPr id="14" name="TextBox 13">
+            <a:extLst>
+              <a:ext uri="{FF2B5EF4-FFF2-40B4-BE49-F238E27FC236}">
+                <a16:creationId xmlns:a16="http://schemas.microsoft.com/office/drawing/2014/main" id="{D6F20C00-E38B-2A56-B4AB-92ED988260FF}"/>
+              </a:ext>
+            </a:extLst>
+          </p:cNvPr>
+          <p:cNvSpPr txBox="1"/>
+          <p:nvPr/>
+        </p:nvSpPr>
+        <p:spPr>
+          <a:xfrm>
+            <a:off x="7039317" y="1078578"/>
+            <a:ext cx="3803943" cy="369332"/>
+          </a:xfrm>
+          <a:prstGeom prst="rect">
+            <a:avLst/>
+          </a:prstGeom>
+          <a:noFill/>
+        </p:spPr>
+        <p:txBody>
+          <a:bodyPr wrap="square" rtlCol="0">
+            <a:spAutoFit/>
+          </a:bodyPr>
+          <a:lstStyle/>
+          <a:p>
+            <a:r>
+              <a:rPr lang="en-US" dirty="0"/>
+              <a:t>Ahle_CLM_S_Current.csv</a:t>
+            </a:r>
+          </a:p>
+        </p:txBody>
+      </p:sp>
+      <p:pic>
+        <p:nvPicPr>
+          <p:cNvPr id="16" name="Picture 15">
+            <a:extLst>
+              <a:ext uri="{FF2B5EF4-FFF2-40B4-BE49-F238E27FC236}">
+                <a16:creationId xmlns:a16="http://schemas.microsoft.com/office/drawing/2014/main" id="{D2A1184A-EE16-8FB0-079D-CEFC0A4937CA}"/>
+              </a:ext>
+            </a:extLst>
+          </p:cNvPr>
+          <p:cNvPicPr>
+            <a:picLocks noChangeAspect="1"/>
+          </p:cNvPicPr>
+          <p:nvPr/>
+        </p:nvPicPr>
+        <p:blipFill>
+          <a:blip r:embed="rId4"/>
+          <a:stretch>
+            <a:fillRect/>
+          </a:stretch>
+        </p:blipFill>
+        <p:spPr>
+          <a:xfrm>
+            <a:off x="7039317" y="4114800"/>
+            <a:ext cx="4047783" cy="2090222"/>
+          </a:xfrm>
+          <a:prstGeom prst="rect">
+            <a:avLst/>
+          </a:prstGeom>
+        </p:spPr>
+      </p:pic>
+      <p:sp>
+        <p:nvSpPr>
+          <p:cNvPr id="17" name="TextBox 16">
+            <a:extLst>
+              <a:ext uri="{FF2B5EF4-FFF2-40B4-BE49-F238E27FC236}">
+                <a16:creationId xmlns:a16="http://schemas.microsoft.com/office/drawing/2014/main" id="{04C44785-C647-AA46-80BE-C8ECD93C7E56}"/>
+              </a:ext>
+            </a:extLst>
+          </p:cNvPr>
+          <p:cNvSpPr txBox="1"/>
+          <p:nvPr/>
+        </p:nvSpPr>
+        <p:spPr>
+          <a:xfrm>
+            <a:off x="7039316" y="3745468"/>
+            <a:ext cx="3803943" cy="369332"/>
+          </a:xfrm>
+          <a:prstGeom prst="rect">
+            <a:avLst/>
+          </a:prstGeom>
+          <a:noFill/>
+        </p:spPr>
+        <p:txBody>
+          <a:bodyPr wrap="square" rtlCol="0">
+            <a:spAutoFit/>
+          </a:bodyPr>
+          <a:lstStyle/>
+          <a:p>
+            <a:r>
+              <a:rPr lang="en-US" dirty="0"/>
+              <a:t>Ahle_CLM_S_Ideal.csv</a:t>
+            </a:r>
+          </a:p>
+        </p:txBody>
+      </p:sp>
+      <p:sp>
+        <p:nvSpPr>
+          <p:cNvPr id="18" name="Rectangle 17">
+            <a:extLst>
+              <a:ext uri="{FF2B5EF4-FFF2-40B4-BE49-F238E27FC236}">
+                <a16:creationId xmlns:a16="http://schemas.microsoft.com/office/drawing/2014/main" id="{000F308C-9DAC-80A1-FB09-1F3F0D02AF79}"/>
+              </a:ext>
+            </a:extLst>
+          </p:cNvPr>
+          <p:cNvSpPr/>
+          <p:nvPr/>
+        </p:nvSpPr>
+        <p:spPr>
+          <a:xfrm>
+            <a:off x="2423160" y="1447800"/>
+            <a:ext cx="510540" cy="182880"/>
+          </a:xfrm>
+          <a:prstGeom prst="rect">
+            <a:avLst/>
+          </a:prstGeom>
+          <a:noFill/>
+          <a:ln w="28575">
+            <a:solidFill>
+              <a:srgbClr val="FF0000"/>
+            </a:solidFill>
+          </a:ln>
+          <a:scene3d>
+            <a:camera prst="orthographicFront"/>
+            <a:lightRig rig="threePt" dir="tl"/>
+          </a:scene3d>
+          <a:sp3d/>
+        </p:spPr>
+        <p:style>
+          <a:lnRef idx="1">
+            <a:schemeClr val="accent1"/>
+          </a:lnRef>
+          <a:fillRef idx="3">
+            <a:schemeClr val="accent1"/>
+          </a:fillRef>
+          <a:effectRef idx="2">
+            <a:schemeClr val="accent1"/>
+          </a:effectRef>
+          <a:fontRef idx="minor">
+            <a:schemeClr val="lt1"/>
+          </a:fontRef>
+        </p:style>
+        <p:txBody>
+          <a:bodyPr rtlCol="0" anchor="ctr"/>
+          <a:lstStyle/>
+          <a:p>
+            <a:pPr algn="ctr"/>
+            <a:endParaRPr lang="en-US"/>
+          </a:p>
+        </p:txBody>
+      </p:sp>
+      <p:sp>
+        <p:nvSpPr>
+          <p:cNvPr id="19" name="Rectangle 18">
+            <a:extLst>
+              <a:ext uri="{FF2B5EF4-FFF2-40B4-BE49-F238E27FC236}">
+                <a16:creationId xmlns:a16="http://schemas.microsoft.com/office/drawing/2014/main" id="{CDF6FFF4-CD10-7BDC-B09D-1083EA45B69F}"/>
+              </a:ext>
+            </a:extLst>
+          </p:cNvPr>
+          <p:cNvSpPr/>
+          <p:nvPr/>
+        </p:nvSpPr>
+        <p:spPr>
+          <a:xfrm>
+            <a:off x="2983230" y="1447800"/>
+            <a:ext cx="510540" cy="182880"/>
+          </a:xfrm>
+          <a:prstGeom prst="rect">
+            <a:avLst/>
+          </a:prstGeom>
+          <a:noFill/>
+          <a:ln w="28575">
+            <a:solidFill>
+              <a:srgbClr val="FF0000"/>
+            </a:solidFill>
+          </a:ln>
+          <a:scene3d>
+            <a:camera prst="orthographicFront"/>
+            <a:lightRig rig="threePt" dir="tl"/>
+          </a:scene3d>
+          <a:sp3d/>
+        </p:spPr>
+        <p:style>
+          <a:lnRef idx="1">
+            <a:schemeClr val="accent1"/>
+          </a:lnRef>
+          <a:fillRef idx="3">
+            <a:schemeClr val="accent1"/>
+          </a:fillRef>
+          <a:effectRef idx="2">
+            <a:schemeClr val="accent1"/>
+          </a:effectRef>
+          <a:fontRef idx="minor">
+            <a:schemeClr val="lt1"/>
+          </a:fontRef>
+        </p:style>
+        <p:txBody>
+          <a:bodyPr rtlCol="0" anchor="ctr"/>
+          <a:lstStyle/>
+          <a:p>
+            <a:pPr algn="ctr"/>
+            <a:endParaRPr lang="en-US"/>
+          </a:p>
+        </p:txBody>
+      </p:sp>
+      <p:cxnSp>
+        <p:nvCxnSpPr>
+          <p:cNvPr id="21" name="Connector: Elbow 20">
+            <a:extLst>
+              <a:ext uri="{FF2B5EF4-FFF2-40B4-BE49-F238E27FC236}">
+                <a16:creationId xmlns:a16="http://schemas.microsoft.com/office/drawing/2014/main" id="{C0560E58-BD2A-4D70-685B-B8379F452671}"/>
+              </a:ext>
+            </a:extLst>
+          </p:cNvPr>
+          <p:cNvCxnSpPr>
+            <a:cxnSpLocks/>
+            <a:stCxn id="19" idx="3"/>
+            <a:endCxn id="17" idx="1"/>
+          </p:cNvCxnSpPr>
+          <p:nvPr/>
+        </p:nvCxnSpPr>
+        <p:spPr>
+          <a:xfrm>
+            <a:off x="3493770" y="1539240"/>
+            <a:ext cx="3545546" cy="2390894"/>
+          </a:xfrm>
+          <a:prstGeom prst="bentConnector3">
+            <a:avLst>
+              <a:gd name="adj1" fmla="val 50000"/>
+            </a:avLst>
+          </a:prstGeom>
+          <a:ln>
+            <a:tailEnd type="triangle"/>
+          </a:ln>
+        </p:spPr>
+        <p:style>
+          <a:lnRef idx="2">
+            <a:schemeClr val="accent1"/>
+          </a:lnRef>
+          <a:fillRef idx="0">
+            <a:schemeClr val="accent1"/>
+          </a:fillRef>
+          <a:effectRef idx="1">
+            <a:schemeClr val="accent1"/>
+          </a:effectRef>
+          <a:fontRef idx="minor">
+            <a:schemeClr val="tx1"/>
+          </a:fontRef>
+        </p:style>
+      </p:cxnSp>
+      <p:cxnSp>
+        <p:nvCxnSpPr>
+          <p:cNvPr id="27" name="Connector: Elbow 26">
+            <a:extLst>
+              <a:ext uri="{FF2B5EF4-FFF2-40B4-BE49-F238E27FC236}">
+                <a16:creationId xmlns:a16="http://schemas.microsoft.com/office/drawing/2014/main" id="{5575650E-345A-6419-1471-1B3588AC034E}"/>
+              </a:ext>
+            </a:extLst>
+          </p:cNvPr>
+          <p:cNvCxnSpPr>
+            <a:cxnSpLocks/>
+            <a:stCxn id="18" idx="0"/>
+            <a:endCxn id="14" idx="1"/>
+          </p:cNvCxnSpPr>
+          <p:nvPr/>
+        </p:nvCxnSpPr>
+        <p:spPr>
+          <a:xfrm rot="5400000" flipH="1" flipV="1">
+            <a:off x="4766595" y="-824921"/>
+            <a:ext cx="184556" cy="4360887"/>
+          </a:xfrm>
+          <a:prstGeom prst="bentConnector2">
+            <a:avLst/>
+          </a:prstGeom>
+          <a:ln>
+            <a:tailEnd type="triangle"/>
+          </a:ln>
+        </p:spPr>
+        <p:style>
+          <a:lnRef idx="2">
+            <a:schemeClr val="accent1"/>
+          </a:lnRef>
+          <a:fillRef idx="0">
+            <a:schemeClr val="accent1"/>
+          </a:fillRef>
+          <a:effectRef idx="1">
+            <a:schemeClr val="accent1"/>
+          </a:effectRef>
+          <a:fontRef idx="minor">
+            <a:schemeClr val="tx1"/>
+          </a:fontRef>
+        </p:style>
+      </p:cxnSp>
+    </p:spTree>
+    <p:extLst>
+      <p:ext uri="{BB962C8B-B14F-4D97-AF65-F5344CB8AC3E}">
+        <p14:creationId xmlns:p14="http://schemas.microsoft.com/office/powerpoint/2010/main" val="1024155620"/>
+      </p:ext>
+    </p:extLst>
+  </p:cSld>
+  <p:clrMapOvr>
+    <a:masterClrMapping/>
+  </p:clrMapOvr>
+</p:sld>
+</file>
+
+<file path=ppt/slides/slide4.xml><?xml version="1.0" encoding="utf-8"?>
+<p:sld xmlns:a="http://schemas.openxmlformats.org/drawingml/2006/main" xmlns:r="http://schemas.openxmlformats.org/officeDocument/2006/relationships" xmlns:p="http://schemas.openxmlformats.org/presentationml/2006/main">
+  <p:cSld>
+    <p:spTree>
+      <p:nvGrpSpPr>
+        <p:cNvPr id="1" name=""/>
+        <p:cNvGrpSpPr/>
+        <p:nvPr/>
+      </p:nvGrpSpPr>
+      <p:grpSpPr>
+        <a:xfrm>
+          <a:off x="0" y="0"/>
+          <a:ext cx="0" cy="0"/>
+          <a:chOff x="0" y="0"/>
+          <a:chExt cx="0" cy="0"/>
+        </a:xfrm>
+      </p:grpSpPr>
+      <p:sp>
+        <p:nvSpPr>
+          <p:cNvPr id="2" name="Title 1">
+            <a:extLst>
+              <a:ext uri="{FF2B5EF4-FFF2-40B4-BE49-F238E27FC236}">
+                <a16:creationId xmlns:a16="http://schemas.microsoft.com/office/drawing/2014/main" id="{3F985CB5-46A2-12CA-6592-392FA2FF13C0}"/>
+              </a:ext>
+            </a:extLst>
+          </p:cNvPr>
+          <p:cNvSpPr>
+            <a:spLocks noGrp="1"/>
+          </p:cNvSpPr>
+          <p:nvPr>
+            <p:ph type="title"/>
+          </p:nvPr>
+        </p:nvSpPr>
+        <p:spPr/>
+        <p:txBody>
+          <a:bodyPr>
+            <a:normAutofit/>
+          </a:bodyPr>
+          <a:lstStyle/>
+          <a:p>
+            <a:r>
+              <a:rPr lang="en-US" sz="4400" dirty="0"/>
+              <a:t>1_run_ahle_ simulation_standalone.py</a:t>
+            </a:r>
+            <a:endParaRPr lang="en-US" dirty="0"/>
+          </a:p>
+        </p:txBody>
+      </p:sp>
+      <p:sp>
+        <p:nvSpPr>
+          <p:cNvPr id="3" name="Content Placeholder 2">
+            <a:extLst>
+              <a:ext uri="{FF2B5EF4-FFF2-40B4-BE49-F238E27FC236}">
+                <a16:creationId xmlns:a16="http://schemas.microsoft.com/office/drawing/2014/main" id="{45D1873C-9855-4F87-87F7-824AB47D0144}"/>
+              </a:ext>
+            </a:extLst>
+          </p:cNvPr>
+          <p:cNvSpPr>
+            <a:spLocks noGrp="1"/>
+          </p:cNvSpPr>
+          <p:nvPr>
+            <p:ph idx="1"/>
+          </p:nvPr>
+        </p:nvSpPr>
+        <p:spPr>
+          <a:xfrm>
+            <a:off x="295617" y="1189788"/>
+            <a:ext cx="7332003" cy="5138928"/>
+          </a:xfrm>
+        </p:spPr>
+        <p:txBody>
+          <a:bodyPr/>
+          <a:lstStyle/>
+          <a:p>
+            <a:pPr marL="457200" indent="-457200">
+              <a:buFont typeface="Arial"/>
+              <a:buAutoNum type="arabicPeriod"/>
+            </a:pPr>
+            <a:r>
+              <a:rPr lang="en-US" dirty="0"/>
+              <a:t>Call compartmental model simulation function (</a:t>
+            </a:r>
+            <a:r>
+              <a:rPr lang="en-US" sz="2000" i="1" dirty="0"/>
+              <a:t>Run AHLE with control table </a:t>
+            </a:r>
+            <a:r>
+              <a:rPr lang="en-US" sz="2000" i="1" dirty="0" err="1"/>
+              <a:t>model.R</a:t>
+            </a:r>
+            <a:r>
+              <a:rPr lang="en-US" dirty="0"/>
+              <a:t>) for each species, passing the appropriate AHLE scenario parameter file</a:t>
+            </a:r>
+          </a:p>
+          <a:p>
+            <a:pPr marL="457200" indent="-457200">
+              <a:buAutoNum type="arabicPeriod"/>
+            </a:pPr>
+            <a:endParaRPr lang="en-US" dirty="0"/>
+          </a:p>
+        </p:txBody>
+      </p:sp>
+    </p:spTree>
+    <p:extLst>
+      <p:ext uri="{BB962C8B-B14F-4D97-AF65-F5344CB8AC3E}">
+        <p14:creationId xmlns:p14="http://schemas.microsoft.com/office/powerpoint/2010/main" val="4133539288"/>
+      </p:ext>
+    </p:extLst>
+  </p:cSld>
+  <p:clrMapOvr>
+    <a:masterClrMapping/>
+  </p:clrMapOvr>
+</p:sld>
+</file>
+
+<file path=ppt/slides/slide5.xml><?xml version="1.0" encoding="utf-8"?>
+<p:sld xmlns:a="http://schemas.openxmlformats.org/drawingml/2006/main" xmlns:r="http://schemas.openxmlformats.org/officeDocument/2006/relationships" xmlns:p="http://schemas.openxmlformats.org/presentationml/2006/main">
+  <p:cSld>
+    <p:spTree>
+      <p:nvGrpSpPr>
+        <p:cNvPr id="1" name=""/>
+        <p:cNvGrpSpPr/>
+        <p:nvPr/>
+      </p:nvGrpSpPr>
+      <p:grpSpPr>
+        <a:xfrm>
+          <a:off x="0" y="0"/>
+          <a:ext cx="0" cy="0"/>
+          <a:chOff x="0" y="0"/>
+          <a:chExt cx="0" cy="0"/>
+        </a:xfrm>
+      </p:grpSpPr>
+      <p:sp>
+        <p:nvSpPr>
+          <p:cNvPr id="2" name="Title 1">
+            <a:extLst>
+              <a:ext uri="{FF2B5EF4-FFF2-40B4-BE49-F238E27FC236}">
+                <a16:creationId xmlns:a16="http://schemas.microsoft.com/office/drawing/2014/main" id="{447E28C1-FB1D-3B9A-82F2-92C8F200ACE3}"/>
+              </a:ext>
+            </a:extLst>
+          </p:cNvPr>
+          <p:cNvSpPr>
+            <a:spLocks noGrp="1"/>
+          </p:cNvSpPr>
+          <p:nvPr>
+            <p:ph type="title"/>
+          </p:nvPr>
+        </p:nvSpPr>
+        <p:spPr/>
+        <p:txBody>
+          <a:bodyPr>
+            <a:normAutofit/>
+          </a:bodyPr>
+          <a:lstStyle/>
+          <a:p>
+            <a:r>
+              <a:rPr lang="en-US" sz="4400" dirty="0"/>
+              <a:t>2_process_simulation_results_standalone.py</a:t>
+            </a:r>
+            <a:endParaRPr lang="en-US" dirty="0"/>
+          </a:p>
+        </p:txBody>
+      </p:sp>
+      <p:sp>
+        <p:nvSpPr>
+          <p:cNvPr id="3" name="Content Placeholder 2">
+            <a:extLst>
+              <a:ext uri="{FF2B5EF4-FFF2-40B4-BE49-F238E27FC236}">
+                <a16:creationId xmlns:a16="http://schemas.microsoft.com/office/drawing/2014/main" id="{9D38D416-C551-E78C-FD43-FCCE8007CB00}"/>
+              </a:ext>
+            </a:extLst>
+          </p:cNvPr>
+          <p:cNvSpPr>
+            <a:spLocks noGrp="1"/>
+          </p:cNvSpPr>
+          <p:nvPr>
+            <p:ph idx="1"/>
+          </p:nvPr>
+        </p:nvSpPr>
+        <p:spPr>
+          <a:xfrm>
+            <a:off x="295617" y="1189788"/>
+            <a:ext cx="5800383" cy="5138928"/>
+          </a:xfrm>
+        </p:spPr>
+        <p:txBody>
+          <a:bodyPr>
+            <a:normAutofit/>
+          </a:bodyPr>
+          <a:lstStyle/>
+          <a:p>
+            <a:r>
+              <a:rPr lang="en-US" dirty="0"/>
+              <a:t>Steps</a:t>
+            </a:r>
+          </a:p>
+          <a:p>
+            <a:pPr marL="457200" indent="-457200">
+              <a:buAutoNum type="arabicPeriod"/>
+            </a:pPr>
+            <a:r>
+              <a:rPr lang="en-US" sz="1800" dirty="0"/>
+              <a:t>Combine outputs from all scenarios into a single file [ahle_all_stacked.csv]</a:t>
+            </a:r>
+          </a:p>
+          <a:p>
+            <a:pPr marL="457200" indent="-457200">
+              <a:buAutoNum type="arabicPeriod"/>
+            </a:pPr>
+            <a:endParaRPr lang="en-US" sz="1800" dirty="0"/>
+          </a:p>
+          <a:p>
+            <a:pPr marL="457200" indent="-457200">
+              <a:buAutoNum type="arabicPeriod"/>
+            </a:pPr>
+            <a:r>
+              <a:rPr lang="en-US" sz="1800" dirty="0"/>
+              <a:t>Create species summaries (e.g. All Poultry), add currency conversion, and structure to enable comparison of individual production and cost items between scenarios [ahle_all_scensmry.csv]</a:t>
+            </a:r>
+          </a:p>
+          <a:p>
+            <a:pPr marL="457200" indent="-457200">
+              <a:buAutoNum type="arabicPeriod"/>
+            </a:pPr>
+            <a:endParaRPr lang="en-US" sz="1800" dirty="0"/>
+          </a:p>
+          <a:p>
+            <a:pPr marL="457200" indent="-457200">
+              <a:buAutoNum type="arabicPeriod"/>
+            </a:pPr>
+            <a:r>
+              <a:rPr lang="en-US" sz="1800" dirty="0"/>
+              <a:t>Create simplified summary of AHLE for each scenario using system total gross margin [ahle_all_summary2.csv]</a:t>
+            </a:r>
+          </a:p>
+        </p:txBody>
+      </p:sp>
+      <p:sp>
+        <p:nvSpPr>
+          <p:cNvPr id="6" name="TextBox 5">
+            <a:extLst>
+              <a:ext uri="{FF2B5EF4-FFF2-40B4-BE49-F238E27FC236}">
+                <a16:creationId xmlns:a16="http://schemas.microsoft.com/office/drawing/2014/main" id="{26D8A07D-6818-4992-9A6A-9F77E08D5D49}"/>
+              </a:ext>
+            </a:extLst>
+          </p:cNvPr>
+          <p:cNvSpPr txBox="1"/>
+          <p:nvPr/>
+        </p:nvSpPr>
+        <p:spPr>
+          <a:xfrm>
+            <a:off x="7078296" y="4952544"/>
+            <a:ext cx="2866684" cy="307777"/>
+          </a:xfrm>
+          <a:prstGeom prst="rect">
+            <a:avLst/>
+          </a:prstGeom>
+          <a:noFill/>
+        </p:spPr>
+        <p:txBody>
+          <a:bodyPr wrap="square" rtlCol="0">
+            <a:spAutoFit/>
+          </a:bodyPr>
+          <a:lstStyle/>
+          <a:p>
+            <a:r>
+              <a:rPr lang="en-US" sz="1400" dirty="0"/>
+              <a:t>Ahle_all_summary2.csv</a:t>
+            </a:r>
+          </a:p>
+        </p:txBody>
+      </p:sp>
+      <p:sp>
+        <p:nvSpPr>
+          <p:cNvPr id="7" name="TextBox 6">
+            <a:extLst>
+              <a:ext uri="{FF2B5EF4-FFF2-40B4-BE49-F238E27FC236}">
+                <a16:creationId xmlns:a16="http://schemas.microsoft.com/office/drawing/2014/main" id="{D1EF34A8-0086-2CE1-AD8C-3E977F0732A4}"/>
+              </a:ext>
+            </a:extLst>
+          </p:cNvPr>
+          <p:cNvSpPr txBox="1"/>
+          <p:nvPr/>
+        </p:nvSpPr>
+        <p:spPr>
+          <a:xfrm>
+            <a:off x="7078980" y="1014281"/>
+            <a:ext cx="2866684" cy="307777"/>
+          </a:xfrm>
+          <a:prstGeom prst="rect">
+            <a:avLst/>
+          </a:prstGeom>
+          <a:noFill/>
+        </p:spPr>
+        <p:txBody>
+          <a:bodyPr wrap="square" rtlCol="0">
+            <a:spAutoFit/>
+          </a:bodyPr>
+          <a:lstStyle/>
+          <a:p>
+            <a:r>
+              <a:rPr lang="en-US" sz="1400" dirty="0"/>
+              <a:t>Ahle_all_stacked.csv</a:t>
+            </a:r>
+          </a:p>
+        </p:txBody>
+      </p:sp>
+      <p:sp>
+        <p:nvSpPr>
+          <p:cNvPr id="8" name="TextBox 7">
+            <a:extLst>
+              <a:ext uri="{FF2B5EF4-FFF2-40B4-BE49-F238E27FC236}">
+                <a16:creationId xmlns:a16="http://schemas.microsoft.com/office/drawing/2014/main" id="{5D4BAA1F-3425-22B2-9189-247849DA6C4B}"/>
+              </a:ext>
+            </a:extLst>
+          </p:cNvPr>
+          <p:cNvSpPr txBox="1"/>
+          <p:nvPr/>
+        </p:nvSpPr>
+        <p:spPr>
+          <a:xfrm>
+            <a:off x="7078296" y="2975344"/>
+            <a:ext cx="2866684" cy="307777"/>
+          </a:xfrm>
+          <a:prstGeom prst="rect">
+            <a:avLst/>
+          </a:prstGeom>
+          <a:noFill/>
+        </p:spPr>
+        <p:txBody>
+          <a:bodyPr wrap="square" rtlCol="0">
+            <a:spAutoFit/>
+          </a:bodyPr>
+          <a:lstStyle/>
+          <a:p>
+            <a:r>
+              <a:rPr lang="en-US" sz="1400" dirty="0"/>
+              <a:t>Ahle_all_scensmry.csv</a:t>
+            </a:r>
+          </a:p>
+        </p:txBody>
+      </p:sp>
+      <p:sp>
+        <p:nvSpPr>
+          <p:cNvPr id="14" name="TextBox 13">
+            <a:extLst>
+              <a:ext uri="{FF2B5EF4-FFF2-40B4-BE49-F238E27FC236}">
+                <a16:creationId xmlns:a16="http://schemas.microsoft.com/office/drawing/2014/main" id="{6AC0F7F3-B4A9-D2ED-B49A-A8FC04CB590C}"/>
+              </a:ext>
+            </a:extLst>
+          </p:cNvPr>
+          <p:cNvSpPr txBox="1"/>
+          <p:nvPr/>
+        </p:nvSpPr>
+        <p:spPr>
+          <a:xfrm>
+            <a:off x="838200" y="5401793"/>
+            <a:ext cx="5665470" cy="707886"/>
+          </a:xfrm>
+          <a:prstGeom prst="rect">
+            <a:avLst/>
+          </a:prstGeom>
+          <a:solidFill>
+            <a:schemeClr val="accent3"/>
+          </a:solidFill>
+        </p:spPr>
+        <p:txBody>
+          <a:bodyPr wrap="square">
+            <a:spAutoFit/>
+          </a:bodyPr>
+          <a:lstStyle/>
+          <a:p>
+            <a:r>
+              <a:rPr lang="en-US" sz="1000" dirty="0" err="1"/>
+              <a:t>ahle_total_mean</a:t>
+            </a:r>
+            <a:r>
+              <a:rPr lang="en-US" sz="1000" dirty="0"/>
+              <a:t> = </a:t>
+            </a:r>
+            <a:r>
+              <a:rPr lang="en-US" sz="1000" dirty="0" err="1"/>
+              <a:t>mean_ideal_gross_margin</a:t>
+            </a:r>
+            <a:r>
+              <a:rPr lang="en-US" sz="1000" dirty="0"/>
+              <a:t> - </a:t>
+            </a:r>
+            <a:r>
+              <a:rPr lang="en-US" sz="1000" dirty="0" err="1"/>
+              <a:t>mean_current_gross_margin</a:t>
+            </a:r>
+            <a:endParaRPr lang="en-US" sz="1000" dirty="0"/>
+          </a:p>
+          <a:p>
+            <a:r>
+              <a:rPr lang="en-US" sz="1000" dirty="0" err="1"/>
+              <a:t>ahle_dueto_mortality_mean</a:t>
+            </a:r>
+            <a:r>
+              <a:rPr lang="en-US" sz="1000" dirty="0"/>
+              <a:t> = </a:t>
+            </a:r>
+            <a:r>
+              <a:rPr lang="en-US" sz="1000" dirty="0" err="1"/>
+              <a:t>mean_mortality_zero_gross_margin</a:t>
+            </a:r>
+            <a:r>
+              <a:rPr lang="en-US" sz="1000" dirty="0"/>
+              <a:t> - </a:t>
+            </a:r>
+            <a:r>
+              <a:rPr lang="en-US" sz="1000" dirty="0" err="1"/>
+              <a:t>mean_current_gross_margin</a:t>
+            </a:r>
+            <a:endParaRPr lang="en-US" sz="1000" dirty="0"/>
+          </a:p>
+          <a:p>
+            <a:r>
+              <a:rPr lang="en-US" sz="1000" dirty="0"/>
+              <a:t>…</a:t>
+            </a:r>
+          </a:p>
+          <a:p>
+            <a:r>
+              <a:rPr lang="en-US" sz="1000" dirty="0" err="1"/>
+              <a:t>ahle_when_af_ideal_mean</a:t>
+            </a:r>
+            <a:r>
+              <a:rPr lang="en-US" sz="1000" dirty="0"/>
+              <a:t> = </a:t>
+            </a:r>
+            <a:r>
+              <a:rPr lang="en-US" sz="1000" dirty="0" err="1"/>
+              <a:t>mean_ideal_af_gross_margin</a:t>
+            </a:r>
+            <a:r>
+              <a:rPr lang="en-US" sz="1000" dirty="0"/>
+              <a:t> - </a:t>
+            </a:r>
+            <a:r>
+              <a:rPr lang="en-US" sz="1000" dirty="0" err="1"/>
+              <a:t>mean_current_gross_margin</a:t>
+            </a:r>
+            <a:endParaRPr lang="en-US" sz="1000" dirty="0"/>
+          </a:p>
+        </p:txBody>
+      </p:sp>
+      <p:pic>
+        <p:nvPicPr>
+          <p:cNvPr id="10" name="Picture 9">
+            <a:extLst>
+              <a:ext uri="{FF2B5EF4-FFF2-40B4-BE49-F238E27FC236}">
+                <a16:creationId xmlns:a16="http://schemas.microsoft.com/office/drawing/2014/main" id="{704ABB21-0FC8-FF8D-F9D6-1B98771396DB}"/>
+              </a:ext>
+            </a:extLst>
+          </p:cNvPr>
+          <p:cNvPicPr>
+            <a:picLocks noChangeAspect="1"/>
+          </p:cNvPicPr>
+          <p:nvPr/>
+        </p:nvPicPr>
+        <p:blipFill>
+          <a:blip r:embed="rId2"/>
+          <a:stretch>
+            <a:fillRect/>
+          </a:stretch>
+        </p:blipFill>
+        <p:spPr>
+          <a:xfrm>
+            <a:off x="7078980" y="1292559"/>
+            <a:ext cx="3741420" cy="1573097"/>
+          </a:xfrm>
+          <a:prstGeom prst="rect">
+            <a:avLst/>
+          </a:prstGeom>
+        </p:spPr>
+      </p:pic>
+      <p:pic>
+        <p:nvPicPr>
+          <p:cNvPr id="5" name="Picture 4">
+            <a:extLst>
+              <a:ext uri="{FF2B5EF4-FFF2-40B4-BE49-F238E27FC236}">
+                <a16:creationId xmlns:a16="http://schemas.microsoft.com/office/drawing/2014/main" id="{E99038A7-3307-BECA-E3BE-3E793AC2ECED}"/>
+              </a:ext>
+            </a:extLst>
+          </p:cNvPr>
+          <p:cNvPicPr>
+            <a:picLocks noChangeAspect="1"/>
+          </p:cNvPicPr>
+          <p:nvPr/>
+        </p:nvPicPr>
+        <p:blipFill>
+          <a:blip r:embed="rId3"/>
+          <a:stretch>
+            <a:fillRect/>
+          </a:stretch>
+        </p:blipFill>
+        <p:spPr>
+          <a:xfrm>
+            <a:off x="7078296" y="5260321"/>
+            <a:ext cx="3636304" cy="1166796"/>
+          </a:xfrm>
+          <a:prstGeom prst="rect">
+            <a:avLst/>
+          </a:prstGeom>
+        </p:spPr>
+      </p:pic>
+      <p:pic>
+        <p:nvPicPr>
+          <p:cNvPr id="12" name="Picture 11">
+            <a:extLst>
+              <a:ext uri="{FF2B5EF4-FFF2-40B4-BE49-F238E27FC236}">
+                <a16:creationId xmlns:a16="http://schemas.microsoft.com/office/drawing/2014/main" id="{22AAD2A0-5ADF-EC59-8ADD-4026E8D3C495}"/>
+              </a:ext>
+            </a:extLst>
+          </p:cNvPr>
+          <p:cNvPicPr>
+            <a:picLocks noChangeAspect="1"/>
+          </p:cNvPicPr>
+          <p:nvPr/>
+        </p:nvPicPr>
+        <p:blipFill>
+          <a:blip r:embed="rId4"/>
+          <a:stretch>
+            <a:fillRect/>
+          </a:stretch>
+        </p:blipFill>
+        <p:spPr>
+          <a:xfrm>
+            <a:off x="7078296" y="3283121"/>
+            <a:ext cx="3886200" cy="1604473"/>
+          </a:xfrm>
+          <a:prstGeom prst="rect">
+            <a:avLst/>
+          </a:prstGeom>
+        </p:spPr>
+      </p:pic>
+    </p:spTree>
+    <p:extLst>
+      <p:ext uri="{BB962C8B-B14F-4D97-AF65-F5344CB8AC3E}">
+        <p14:creationId xmlns:p14="http://schemas.microsoft.com/office/powerpoint/2010/main" val="4187037766"/>
+      </p:ext>
+    </p:extLst>
+  </p:cSld>
+  <p:clrMapOvr>
+    <a:masterClrMapping/>
+  </p:clrMapOvr>
+</p:sld>
+</file>
+
+<file path=ppt/slides/slide6.xml><?xml version="1.0" encoding="utf-8"?>
+<p:sld xmlns:a="http://schemas.openxmlformats.org/drawingml/2006/main" xmlns:r="http://schemas.openxmlformats.org/officeDocument/2006/relationships" xmlns:p="http://schemas.openxmlformats.org/presentationml/2006/main">
+  <p:cSld>
+    <p:spTree>
+      <p:nvGrpSpPr>
+        <p:cNvPr id="1" name=""/>
+        <p:cNvGrpSpPr/>
+        <p:nvPr/>
+      </p:nvGrpSpPr>
+      <p:grpSpPr>
+        <a:xfrm>
+          <a:off x="0" y="0"/>
+          <a:ext cx="0" cy="0"/>
+          <a:chOff x="0" y="0"/>
+          <a:chExt cx="0" cy="0"/>
+        </a:xfrm>
+      </p:grpSpPr>
+      <p:sp>
+        <p:nvSpPr>
+          <p:cNvPr id="2" name="Title 1">
+            <a:extLst>
+              <a:ext uri="{FF2B5EF4-FFF2-40B4-BE49-F238E27FC236}">
+                <a16:creationId xmlns:a16="http://schemas.microsoft.com/office/drawing/2014/main" id="{33C74252-FECA-EF14-9759-EAFC5F6454E0}"/>
+              </a:ext>
+            </a:extLst>
+          </p:cNvPr>
+          <p:cNvSpPr>
+            <a:spLocks noGrp="1"/>
+          </p:cNvSpPr>
+          <p:nvPr>
+            <p:ph type="title"/>
+          </p:nvPr>
+        </p:nvSpPr>
+        <p:spPr/>
+        <p:txBody>
+          <a:bodyPr>
+            <a:normAutofit/>
+          </a:bodyPr>
+          <a:lstStyle/>
+          <a:p>
+            <a:r>
+              <a:rPr lang="en-US" sz="4400" dirty="0"/>
+              <a:t>3_run_attribution_standalone.py</a:t>
+            </a:r>
+            <a:endParaRPr lang="en-US" dirty="0"/>
+          </a:p>
+        </p:txBody>
+      </p:sp>
+      <p:sp>
+        <p:nvSpPr>
+          <p:cNvPr id="4" name="Content Placeholder 3">
+            <a:extLst>
+              <a:ext uri="{FF2B5EF4-FFF2-40B4-BE49-F238E27FC236}">
+                <a16:creationId xmlns:a16="http://schemas.microsoft.com/office/drawing/2014/main" id="{E482F8B6-8FC5-91BA-439C-A828888871C3}"/>
+              </a:ext>
+            </a:extLst>
+          </p:cNvPr>
+          <p:cNvSpPr>
+            <a:spLocks noGrp="1"/>
+          </p:cNvSpPr>
+          <p:nvPr>
+            <p:ph idx="1"/>
+          </p:nvPr>
+        </p:nvSpPr>
+        <p:spPr>
+          <a:xfrm>
+            <a:off x="295617" y="1189788"/>
+            <a:ext cx="6836703" cy="5138928"/>
+          </a:xfrm>
+        </p:spPr>
+        <p:txBody>
+          <a:bodyPr/>
+          <a:lstStyle/>
+          <a:p>
+            <a:pPr marL="457200" indent="-457200">
+              <a:buAutoNum type="arabicPeriod"/>
+            </a:pPr>
+            <a:r>
+              <a:rPr lang="en-US" dirty="0"/>
+              <a:t>Split </a:t>
+            </a:r>
+            <a:r>
+              <a:rPr lang="en-US" dirty="0" err="1"/>
+              <a:t>ahle_all_scensmry</a:t>
+            </a:r>
+            <a:r>
+              <a:rPr lang="en-US" dirty="0"/>
+              <a:t> by species and restructure for attribution code [ahle_all_forattr.csv]</a:t>
+            </a:r>
+          </a:p>
+          <a:p>
+            <a:pPr marL="457200" indent="-457200">
+              <a:buAutoNum type="arabicPeriod"/>
+            </a:pPr>
+            <a:endParaRPr lang="en-US" dirty="0"/>
+          </a:p>
+          <a:p>
+            <a:pPr marL="457200" indent="-457200">
+              <a:buAutoNum type="arabicPeriod"/>
+            </a:pPr>
+            <a:r>
+              <a:rPr lang="en-US" dirty="0"/>
+              <a:t>Call attribution function (</a:t>
+            </a:r>
+            <a:r>
+              <a:rPr lang="en-US" i="1" dirty="0"/>
+              <a:t>Attribution </a:t>
+            </a:r>
+            <a:r>
+              <a:rPr lang="en-US" i="1" dirty="0" err="1"/>
+              <a:t>function.R</a:t>
+            </a:r>
+            <a:r>
+              <a:rPr lang="en-US" dirty="0"/>
+              <a:t>) for each species</a:t>
+            </a:r>
+          </a:p>
+          <a:p>
+            <a:pPr marL="457200" indent="-457200">
+              <a:buAutoNum type="arabicPeriod"/>
+            </a:pPr>
+            <a:endParaRPr lang="en-US" dirty="0"/>
+          </a:p>
+          <a:p>
+            <a:pPr marL="457200" indent="-457200">
+              <a:buAutoNum type="arabicPeriod"/>
+            </a:pPr>
+            <a:r>
+              <a:rPr lang="en-US" dirty="0"/>
+              <a:t>Combine results for all species, add placeholder for health cost attribution, add currency conversion, write CSV [ahle_all_withattr.csv]</a:t>
+            </a:r>
+          </a:p>
+        </p:txBody>
+      </p:sp>
+      <p:pic>
+        <p:nvPicPr>
+          <p:cNvPr id="6" name="Picture 5">
+            <a:extLst>
+              <a:ext uri="{FF2B5EF4-FFF2-40B4-BE49-F238E27FC236}">
+                <a16:creationId xmlns:a16="http://schemas.microsoft.com/office/drawing/2014/main" id="{656D23F5-0086-4081-DF41-38C6C27BCA77}"/>
+              </a:ext>
+            </a:extLst>
+          </p:cNvPr>
+          <p:cNvPicPr>
+            <a:picLocks noChangeAspect="1"/>
+          </p:cNvPicPr>
+          <p:nvPr/>
+        </p:nvPicPr>
+        <p:blipFill>
+          <a:blip r:embed="rId2"/>
+          <a:stretch>
+            <a:fillRect/>
+          </a:stretch>
+        </p:blipFill>
+        <p:spPr>
+          <a:xfrm>
+            <a:off x="7450338" y="1338492"/>
+            <a:ext cx="2195039" cy="2316480"/>
+          </a:xfrm>
+          <a:prstGeom prst="rect">
+            <a:avLst/>
+          </a:prstGeom>
+        </p:spPr>
+      </p:pic>
+      <p:sp>
+        <p:nvSpPr>
+          <p:cNvPr id="7" name="TextBox 6">
+            <a:extLst>
+              <a:ext uri="{FF2B5EF4-FFF2-40B4-BE49-F238E27FC236}">
+                <a16:creationId xmlns:a16="http://schemas.microsoft.com/office/drawing/2014/main" id="{07BA48C3-F9CE-E355-E635-EC1498E2ED43}"/>
+              </a:ext>
+            </a:extLst>
+          </p:cNvPr>
+          <p:cNvSpPr txBox="1"/>
+          <p:nvPr/>
+        </p:nvSpPr>
+        <p:spPr>
+          <a:xfrm>
+            <a:off x="7450338" y="1030715"/>
+            <a:ext cx="2866684" cy="307777"/>
+          </a:xfrm>
+          <a:prstGeom prst="rect">
+            <a:avLst/>
+          </a:prstGeom>
+          <a:noFill/>
+        </p:spPr>
+        <p:txBody>
+          <a:bodyPr wrap="square" rtlCol="0">
+            <a:spAutoFit/>
+          </a:bodyPr>
+          <a:lstStyle/>
+          <a:p>
+            <a:r>
+              <a:rPr lang="en-US" sz="1400" dirty="0"/>
+              <a:t>Ahle_all_forattr.csv</a:t>
+            </a:r>
+          </a:p>
+        </p:txBody>
+      </p:sp>
+      <p:sp>
+        <p:nvSpPr>
+          <p:cNvPr id="9" name="TextBox 8">
+            <a:extLst>
+              <a:ext uri="{FF2B5EF4-FFF2-40B4-BE49-F238E27FC236}">
+                <a16:creationId xmlns:a16="http://schemas.microsoft.com/office/drawing/2014/main" id="{60B34638-6411-3DAA-9C8D-C8DB3936CD26}"/>
+              </a:ext>
+            </a:extLst>
+          </p:cNvPr>
+          <p:cNvSpPr txBox="1"/>
+          <p:nvPr/>
+        </p:nvSpPr>
+        <p:spPr>
+          <a:xfrm>
+            <a:off x="9754605" y="1338492"/>
+            <a:ext cx="2269756" cy="1446550"/>
+          </a:xfrm>
+          <a:prstGeom prst="rect">
+            <a:avLst/>
+          </a:prstGeom>
+          <a:solidFill>
+            <a:schemeClr val="accent3"/>
+          </a:solidFill>
+        </p:spPr>
+        <p:txBody>
+          <a:bodyPr wrap="square">
+            <a:spAutoFit/>
+          </a:bodyPr>
+          <a:lstStyle/>
+          <a:p>
+            <a:pPr marL="228600"/>
+            <a:r>
+              <a:rPr lang="en-US" sz="1100" dirty="0"/>
+              <a:t>Note “Age Class” in this data designates the scenario being described and comes from “</a:t>
+            </a:r>
+            <a:r>
+              <a:rPr lang="en-US" sz="1100" dirty="0" err="1"/>
+              <a:t>agesex</a:t>
+            </a:r>
+            <a:r>
+              <a:rPr lang="en-US" sz="1100" dirty="0"/>
+              <a:t> scenario” in </a:t>
+            </a:r>
+            <a:r>
+              <a:rPr lang="en-US" sz="1100" dirty="0" err="1"/>
+              <a:t>ahle_all_scensmry</a:t>
+            </a:r>
+            <a:r>
+              <a:rPr lang="en-US" sz="1100" dirty="0"/>
+              <a:t>. The corresponding AHLE is based on the system total gross margin for that scenario.</a:t>
+            </a:r>
+          </a:p>
+        </p:txBody>
+      </p:sp>
+      <p:pic>
+        <p:nvPicPr>
+          <p:cNvPr id="11" name="Picture 10">
+            <a:extLst>
+              <a:ext uri="{FF2B5EF4-FFF2-40B4-BE49-F238E27FC236}">
+                <a16:creationId xmlns:a16="http://schemas.microsoft.com/office/drawing/2014/main" id="{ED794EC6-7516-A6FE-6F17-455F9AF05345}"/>
+              </a:ext>
+            </a:extLst>
+          </p:cNvPr>
+          <p:cNvPicPr>
+            <a:picLocks noChangeAspect="1"/>
+          </p:cNvPicPr>
+          <p:nvPr/>
+        </p:nvPicPr>
+        <p:blipFill>
+          <a:blip r:embed="rId3"/>
+          <a:stretch>
+            <a:fillRect/>
+          </a:stretch>
+        </p:blipFill>
+        <p:spPr>
+          <a:xfrm>
+            <a:off x="7450338" y="4072959"/>
+            <a:ext cx="4365447" cy="2316480"/>
+          </a:xfrm>
+          <a:prstGeom prst="rect">
+            <a:avLst/>
+          </a:prstGeom>
+        </p:spPr>
+      </p:pic>
+      <p:sp>
+        <p:nvSpPr>
+          <p:cNvPr id="12" name="TextBox 11">
+            <a:extLst>
+              <a:ext uri="{FF2B5EF4-FFF2-40B4-BE49-F238E27FC236}">
+                <a16:creationId xmlns:a16="http://schemas.microsoft.com/office/drawing/2014/main" id="{EC8ACAAC-1EEC-02BF-9830-C4260538B64B}"/>
+              </a:ext>
+            </a:extLst>
+          </p:cNvPr>
+          <p:cNvSpPr txBox="1"/>
+          <p:nvPr/>
+        </p:nvSpPr>
+        <p:spPr>
+          <a:xfrm>
+            <a:off x="7450338" y="3765182"/>
+            <a:ext cx="2866684" cy="307777"/>
+          </a:xfrm>
+          <a:prstGeom prst="rect">
+            <a:avLst/>
+          </a:prstGeom>
+          <a:noFill/>
+        </p:spPr>
+        <p:txBody>
+          <a:bodyPr wrap="square" rtlCol="0">
+            <a:spAutoFit/>
+          </a:bodyPr>
+          <a:lstStyle/>
+          <a:p>
+            <a:r>
+              <a:rPr lang="en-US" sz="1400" dirty="0"/>
+              <a:t>Ahle_all_withattr.csv</a:t>
+            </a:r>
+          </a:p>
+        </p:txBody>
+      </p:sp>
+    </p:spTree>
+    <p:extLst>
+      <p:ext uri="{BB962C8B-B14F-4D97-AF65-F5344CB8AC3E}">
+        <p14:creationId xmlns:p14="http://schemas.microsoft.com/office/powerpoint/2010/main" val="3741795671"/>
       </p:ext>
     </p:extLst>
   </p:cSld>
@@ -7595,6 +8924,21 @@
 </file>
 
 <file path=customXml/item1.xml><?xml version="1.0" encoding="utf-8"?>
+<?mso-contentType ?>
+<FormTemplates xmlns="http://schemas.microsoft.com/sharepoint/v3/contenttype/forms">
+  <Display>DocumentLibraryForm</Display>
+  <Edit>DocumentLibraryForm</Edit>
+  <New>DocumentLibraryForm</New>
+</FormTemplates>
+</file>
+
+<file path=customXml/item2.xml><?xml version="1.0" encoding="utf-8"?>
+<p:properties xmlns:p="http://schemas.microsoft.com/office/2006/metadata/properties" xmlns:xsi="http://www.w3.org/2001/XMLSchema-instance" xmlns:pc="http://schemas.microsoft.com/office/infopath/2007/PartnerControls">
+  <documentManagement/>
+</p:properties>
+</file>
+
+<file path=customXml/item3.xml><?xml version="1.0" encoding="utf-8"?>
 <ct:contentTypeSchema xmlns:ct="http://schemas.microsoft.com/office/2006/metadata/contentType" xmlns:ma="http://schemas.microsoft.com/office/2006/metadata/properties/metaAttributes" ct:_="" ma:_="" ma:contentTypeName="Document" ma:contentTypeID="0x01010077CCB0A28C1DC146B32B4CB950B02E5C" ma:contentTypeVersion="9" ma:contentTypeDescription="Create a new document." ma:contentTypeScope="" ma:versionID="b75bfb2a159bd61f88d6e57f3a13c4a6">
   <xsd:schema xmlns:xsd="http://www.w3.org/2001/XMLSchema" xmlns:xs="http://www.w3.org/2001/XMLSchema" xmlns:p="http://schemas.microsoft.com/office/2006/metadata/properties" xmlns:ns2="792ce9f2-e721-4652-96c5-919719c7bd01" targetNamespace="http://schemas.microsoft.com/office/2006/metadata/properties" ma:root="true" ma:fieldsID="089583b4c9b41bf0ab34ebee47c7108f" ns2:_="">
     <xsd:import namespace="792ce9f2-e721-4652-96c5-919719c7bd01"/>
@@ -7772,35 +9116,10 @@
 </ct:contentTypeSchema>
 </file>
 
-<file path=customXml/item2.xml><?xml version="1.0" encoding="utf-8"?>
-<p:properties xmlns:p="http://schemas.microsoft.com/office/2006/metadata/properties" xmlns:xsi="http://www.w3.org/2001/XMLSchema-instance" xmlns:pc="http://schemas.microsoft.com/office/infopath/2007/PartnerControls">
-  <documentManagement/>
-</p:properties>
-</file>
-
-<file path=customXml/item3.xml><?xml version="1.0" encoding="utf-8"?>
-<?mso-contentType ?>
-<FormTemplates xmlns="http://schemas.microsoft.com/sharepoint/v3/contenttype/forms">
-  <Display>DocumentLibraryForm</Display>
-  <Edit>DocumentLibraryForm</Edit>
-  <New>DocumentLibraryForm</New>
-</FormTemplates>
-</file>
-
 <file path=customXml/itemProps1.xml><?xml version="1.0" encoding="utf-8"?>
-<ds:datastoreItem xmlns:ds="http://schemas.openxmlformats.org/officeDocument/2006/customXml" ds:itemID="{02E03F95-8423-4C85-A206-69DB857DD311}">
+<ds:datastoreItem xmlns:ds="http://schemas.openxmlformats.org/officeDocument/2006/customXml" ds:itemID="{E1CA07E0-5768-4132-BC69-D373E4A1EC03}">
   <ds:schemaRefs>
-    <ds:schemaRef ds:uri="http://schemas.microsoft.com/office/2006/metadata/contentType"/>
-    <ds:schemaRef ds:uri="http://schemas.microsoft.com/office/2006/metadata/properties/metaAttributes"/>
-    <ds:schemaRef ds:uri="http://www.w3.org/2001/XMLSchema"/>
-    <ds:schemaRef ds:uri="http://schemas.microsoft.com/office/2006/metadata/properties"/>
-    <ds:schemaRef ds:uri="792ce9f2-e721-4652-96c5-919719c7bd01"/>
-    <ds:schemaRef ds:uri="http://schemas.microsoft.com/office/2006/documentManagement/types"/>
-    <ds:schemaRef ds:uri="http://schemas.microsoft.com/office/infopath/2007/PartnerControls"/>
-    <ds:schemaRef ds:uri="http://schemas.openxmlformats.org/package/2006/metadata/core-properties"/>
-    <ds:schemaRef ds:uri="http://purl.org/dc/elements/1.1/"/>
-    <ds:schemaRef ds:uri="http://purl.org/dc/terms/"/>
-    <ds:schemaRef ds:uri="http://schemas.microsoft.com/internal/obd"/>
+    <ds:schemaRef ds:uri="http://schemas.microsoft.com/sharepoint/v3/contenttype/forms"/>
   </ds:schemaRefs>
 </ds:datastoreItem>
 </file>
@@ -7822,9 +9141,19 @@
 </file>
 
 <file path=customXml/itemProps3.xml><?xml version="1.0" encoding="utf-8"?>
-<ds:datastoreItem xmlns:ds="http://schemas.openxmlformats.org/officeDocument/2006/customXml" ds:itemID="{E1CA07E0-5768-4132-BC69-D373E4A1EC03}">
+<ds:datastoreItem xmlns:ds="http://schemas.openxmlformats.org/officeDocument/2006/customXml" ds:itemID="{02E03F95-8423-4C85-A206-69DB857DD311}">
   <ds:schemaRefs>
-    <ds:schemaRef ds:uri="http://schemas.microsoft.com/sharepoint/v3/contenttype/forms"/>
+    <ds:schemaRef ds:uri="http://schemas.microsoft.com/office/2006/metadata/contentType"/>
+    <ds:schemaRef ds:uri="http://schemas.microsoft.com/office/2006/metadata/properties/metaAttributes"/>
+    <ds:schemaRef ds:uri="http://www.w3.org/2001/XMLSchema"/>
+    <ds:schemaRef ds:uri="http://schemas.microsoft.com/office/2006/metadata/properties"/>
+    <ds:schemaRef ds:uri="792ce9f2-e721-4652-96c5-919719c7bd01"/>
+    <ds:schemaRef ds:uri="http://schemas.microsoft.com/office/2006/documentManagement/types"/>
+    <ds:schemaRef ds:uri="http://schemas.microsoft.com/office/infopath/2007/PartnerControls"/>
+    <ds:schemaRef ds:uri="http://schemas.openxmlformats.org/package/2006/metadata/core-properties"/>
+    <ds:schemaRef ds:uri="http://purl.org/dc/elements/1.1/"/>
+    <ds:schemaRef ds:uri="http://purl.org/dc/terms/"/>
+    <ds:schemaRef ds:uri="http://schemas.microsoft.com/internal/obd"/>
   </ds:schemaRefs>
 </ds:datastoreItem>
 </file>
</xml_diff>

<commit_message>
Moved Ethiopia AHLE outputs to species-specific subfolders
</commit_message>
<xml_diff>
--- a/Ethiopia Workspace/Documentation/GBADs Ethiopia AHLE and attribution code overview.pptx
+++ b/Ethiopia Workspace/Documentation/GBADs Ethiopia AHLE and attribution code overview.pptx
@@ -218,7 +218,7 @@
           <a:p>
             <a:fld id="{B2714213-9BB5-453D-948D-9A1A8ECD5C5B}" type="datetimeFigureOut">
               <a:rPr lang="en-US" smtClean="0"/>
-              <a:t>2/6/2023</a:t>
+              <a:t>2/15/2023</a:t>
             </a:fld>
             <a:endParaRPr lang="en-US"/>
           </a:p>
@@ -4176,8 +4176,8 @@
         </p:nvCxnSpPr>
         <p:spPr>
           <a:xfrm flipV="1">
-            <a:off x="4826043" y="3606178"/>
-            <a:ext cx="725969" cy="1264858"/>
+            <a:off x="4891878" y="3767108"/>
+            <a:ext cx="660134" cy="1103928"/>
           </a:xfrm>
           <a:prstGeom prst="straightConnector1">
             <a:avLst/>
@@ -4219,8 +4219,8 @@
         </p:nvCxnSpPr>
         <p:spPr>
           <a:xfrm>
-            <a:off x="8755490" y="3608411"/>
-            <a:ext cx="1767730" cy="1539785"/>
+            <a:off x="8755490" y="3769341"/>
+            <a:ext cx="1767730" cy="1378855"/>
           </a:xfrm>
           <a:prstGeom prst="straightConnector1">
             <a:avLst/>
@@ -4262,8 +4262,8 @@
         </p:nvCxnSpPr>
         <p:spPr>
           <a:xfrm flipH="1">
-            <a:off x="10523220" y="3862783"/>
-            <a:ext cx="996572" cy="1285413"/>
+            <a:off x="10523220" y="4023713"/>
+            <a:ext cx="996572" cy="1124483"/>
           </a:xfrm>
           <a:prstGeom prst="straightConnector1">
             <a:avLst/>
@@ -4437,76 +4437,6 @@
       </p:sp>
       <p:sp>
         <p:nvSpPr>
-          <p:cNvPr id="5" name="Flowchart: Multidocument 4">
-            <a:extLst>
-              <a:ext uri="{FF2B5EF4-FFF2-40B4-BE49-F238E27FC236}">
-                <a16:creationId xmlns:a16="http://schemas.microsoft.com/office/drawing/2014/main" id="{954D8599-836F-01DB-27C8-F595804FA5B8}"/>
-              </a:ext>
-            </a:extLst>
-          </p:cNvPr>
-          <p:cNvSpPr/>
-          <p:nvPr/>
-        </p:nvSpPr>
-        <p:spPr>
-          <a:xfrm>
-            <a:off x="4255120" y="3189044"/>
-            <a:ext cx="1128924" cy="834269"/>
-          </a:xfrm>
-          <a:prstGeom prst="flowChartMultidocument">
-            <a:avLst/>
-          </a:prstGeom>
-          <a:solidFill>
-            <a:schemeClr val="tx1">
-              <a:lumMod val="60000"/>
-              <a:lumOff val="40000"/>
-            </a:schemeClr>
-          </a:solidFill>
-          <a:scene3d>
-            <a:camera prst="orthographicFront"/>
-            <a:lightRig rig="threePt" dir="tl"/>
-          </a:scene3d>
-          <a:sp3d/>
-        </p:spPr>
-        <p:style>
-          <a:lnRef idx="1">
-            <a:schemeClr val="accent1"/>
-          </a:lnRef>
-          <a:fillRef idx="3">
-            <a:schemeClr val="accent1"/>
-          </a:fillRef>
-          <a:effectRef idx="2">
-            <a:schemeClr val="accent1"/>
-          </a:effectRef>
-          <a:fontRef idx="minor">
-            <a:schemeClr val="lt1"/>
-          </a:fontRef>
-        </p:style>
-        <p:txBody>
-          <a:bodyPr rtlCol="0" anchor="ctr"/>
-          <a:lstStyle/>
-          <a:p>
-            <a:pPr algn="ctr"/>
-            <a:r>
-              <a:rPr lang="en-US" sz="1200" dirty="0" err="1"/>
-              <a:t>ahle</a:t>
-            </a:r>
-            <a:r>
-              <a:rPr lang="en-US" sz="1200" dirty="0"/>
-              <a:t>_ &lt;</a:t>
-            </a:r>
-            <a:r>
-              <a:rPr lang="en-US" sz="1200" i="1" dirty="0"/>
-              <a:t>scenario&gt; </a:t>
-            </a:r>
-            <a:r>
-              <a:rPr lang="en-US" sz="1200" dirty="0"/>
-              <a:t>.csv</a:t>
-            </a:r>
-          </a:p>
-        </p:txBody>
-      </p:sp>
-      <p:sp>
-        <p:nvSpPr>
           <p:cNvPr id="6" name="Flowchart: Document 5">
             <a:extLst>
               <a:ext uri="{FF2B5EF4-FFF2-40B4-BE49-F238E27FC236}">
@@ -4577,7 +4507,7 @@
         </p:nvSpPr>
         <p:spPr>
           <a:xfrm>
-            <a:off x="5552012" y="3245194"/>
+            <a:off x="5552012" y="3406124"/>
             <a:ext cx="1919038" cy="721967"/>
           </a:xfrm>
           <a:prstGeom prst="rect">
@@ -4632,7 +4562,7 @@
         </p:nvSpPr>
         <p:spPr>
           <a:xfrm>
-            <a:off x="8935588" y="3364220"/>
+            <a:off x="8935588" y="3525150"/>
             <a:ext cx="1884948" cy="483669"/>
           </a:xfrm>
           <a:prstGeom prst="rect">
@@ -4687,7 +4617,7 @@
         </p:nvSpPr>
         <p:spPr>
           <a:xfrm>
-            <a:off x="7624066" y="4834319"/>
+            <a:off x="7624066" y="4995249"/>
             <a:ext cx="1128924" cy="528497"/>
           </a:xfrm>
           <a:prstGeom prst="flowChartDocument">
@@ -4749,7 +4679,7 @@
         </p:nvSpPr>
         <p:spPr>
           <a:xfrm>
-            <a:off x="7626566" y="3261183"/>
+            <a:off x="7626566" y="3422113"/>
             <a:ext cx="1128924" cy="694455"/>
           </a:xfrm>
           <a:prstGeom prst="flowChartDocument">
@@ -4819,7 +4749,7 @@
         </p:nvSpPr>
         <p:spPr>
           <a:xfrm>
-            <a:off x="6645325" y="1265729"/>
+            <a:off x="6915981" y="1265729"/>
             <a:ext cx="1645187" cy="458465"/>
           </a:xfrm>
           <a:prstGeom prst="flowChartDocument">
@@ -4889,8 +4819,8 @@
         </p:nvCxnSpPr>
         <p:spPr>
           <a:xfrm>
-            <a:off x="8290512" y="1494962"/>
-            <a:ext cx="273525" cy="497091"/>
+            <a:off x="8561168" y="1494962"/>
+            <a:ext cx="134539" cy="497091"/>
           </a:xfrm>
           <a:prstGeom prst="straightConnector1">
             <a:avLst/>
@@ -4932,7 +4862,7 @@
         </p:nvCxnSpPr>
         <p:spPr>
           <a:xfrm flipV="1">
-            <a:off x="8755490" y="3606055"/>
+            <a:off x="8755490" y="3766985"/>
             <a:ext cx="180098" cy="2356"/>
           </a:xfrm>
           <a:prstGeom prst="straightConnector1">
@@ -4975,7 +4905,7 @@
         </p:nvCxnSpPr>
         <p:spPr>
           <a:xfrm flipV="1">
-            <a:off x="10820536" y="3604875"/>
+            <a:off x="10820536" y="3765805"/>
             <a:ext cx="134794" cy="1180"/>
           </a:xfrm>
           <a:prstGeom prst="straightConnector1">
@@ -5017,9 +4947,9 @@
           <p:nvPr/>
         </p:nvCxnSpPr>
         <p:spPr>
-          <a:xfrm flipV="1">
-            <a:off x="5384044" y="3606178"/>
-            <a:ext cx="167968" cy="1"/>
+          <a:xfrm>
+            <a:off x="5383437" y="1710996"/>
+            <a:ext cx="168575" cy="2056112"/>
           </a:xfrm>
           <a:prstGeom prst="straightConnector1">
             <a:avLst/>
@@ -5061,7 +4991,7 @@
         </p:nvCxnSpPr>
         <p:spPr>
           <a:xfrm>
-            <a:off x="7471050" y="3606178"/>
+            <a:off x="7471050" y="3767108"/>
             <a:ext cx="153016" cy="1492390"/>
           </a:xfrm>
           <a:prstGeom prst="straightConnector1">
@@ -5104,7 +5034,7 @@
         </p:nvCxnSpPr>
         <p:spPr>
           <a:xfrm>
-            <a:off x="7471050" y="3606178"/>
+            <a:off x="7471050" y="3767108"/>
             <a:ext cx="155516" cy="2233"/>
           </a:xfrm>
           <a:prstGeom prst="straightConnector1">
@@ -5782,7 +5712,7 @@
         </p:nvSpPr>
         <p:spPr>
           <a:xfrm>
-            <a:off x="7622749" y="4046271"/>
+            <a:off x="7622749" y="4207201"/>
             <a:ext cx="1128924" cy="694454"/>
           </a:xfrm>
           <a:prstGeom prst="flowChartDocument">
@@ -5848,7 +5778,7 @@
         </p:nvCxnSpPr>
         <p:spPr>
           <a:xfrm>
-            <a:off x="7471050" y="3606178"/>
+            <a:off x="7471050" y="3767108"/>
             <a:ext cx="151699" cy="787320"/>
           </a:xfrm>
           <a:prstGeom prst="straightConnector1">
@@ -5887,7 +5817,7 @@
         </p:nvSpPr>
         <p:spPr>
           <a:xfrm>
-            <a:off x="6643556" y="1759134"/>
+            <a:off x="6914212" y="1759134"/>
             <a:ext cx="1645187" cy="458466"/>
           </a:xfrm>
           <a:prstGeom prst="flowChartDocument">
@@ -5953,7 +5883,7 @@
         </p:nvSpPr>
         <p:spPr>
           <a:xfrm>
-            <a:off x="6643556" y="2249551"/>
+            <a:off x="6914212" y="2249551"/>
             <a:ext cx="1645187" cy="458465"/>
           </a:xfrm>
           <a:prstGeom prst="flowChartDocument">
@@ -6023,8 +5953,8 @@
         </p:nvCxnSpPr>
         <p:spPr>
           <a:xfrm>
-            <a:off x="8288743" y="1988367"/>
-            <a:ext cx="275294" cy="3686"/>
+            <a:off x="8559399" y="1988367"/>
+            <a:ext cx="136308" cy="3686"/>
           </a:xfrm>
           <a:prstGeom prst="straightConnector1">
             <a:avLst/>
@@ -6066,8 +5996,8 @@
         </p:nvCxnSpPr>
         <p:spPr>
           <a:xfrm flipV="1">
-            <a:off x="8288743" y="1992053"/>
-            <a:ext cx="275294" cy="486731"/>
+            <a:off x="8559399" y="1992053"/>
+            <a:ext cx="136308" cy="486731"/>
           </a:xfrm>
           <a:prstGeom prst="straightConnector1">
             <a:avLst/>
@@ -6105,7 +6035,7 @@
         </p:nvSpPr>
         <p:spPr>
           <a:xfrm>
-            <a:off x="8564037" y="1800339"/>
+            <a:off x="8695707" y="1800339"/>
             <a:ext cx="1884948" cy="383427"/>
           </a:xfrm>
           <a:prstGeom prst="rect">
@@ -6284,49 +6214,6 @@
       </p:cxnSp>
       <p:cxnSp>
         <p:nvCxnSpPr>
-          <p:cNvPr id="148" name="Straight Arrow Connector 147">
-            <a:extLst>
-              <a:ext uri="{FF2B5EF4-FFF2-40B4-BE49-F238E27FC236}">
-                <a16:creationId xmlns:a16="http://schemas.microsoft.com/office/drawing/2014/main" id="{64993230-6260-F8DE-80EF-70D34106DD7F}"/>
-              </a:ext>
-            </a:extLst>
-          </p:cNvPr>
-          <p:cNvCxnSpPr>
-            <a:cxnSpLocks/>
-            <a:stCxn id="33" idx="3"/>
-            <a:endCxn id="5" idx="1"/>
-          </p:cNvCxnSpPr>
-          <p:nvPr/>
-        </p:nvCxnSpPr>
-        <p:spPr>
-          <a:xfrm flipV="1">
-            <a:off x="4123995" y="3606179"/>
-            <a:ext cx="131125" cy="541730"/>
-          </a:xfrm>
-          <a:prstGeom prst="straightConnector1">
-            <a:avLst/>
-          </a:prstGeom>
-          <a:ln w="12700">
-            <a:tailEnd type="triangle"/>
-          </a:ln>
-        </p:spPr>
-        <p:style>
-          <a:lnRef idx="2">
-            <a:schemeClr val="accent1"/>
-          </a:lnRef>
-          <a:fillRef idx="0">
-            <a:schemeClr val="accent1"/>
-          </a:fillRef>
-          <a:effectRef idx="1">
-            <a:schemeClr val="accent1"/>
-          </a:effectRef>
-          <a:fontRef idx="minor">
-            <a:schemeClr val="tx1"/>
-          </a:fontRef>
-        </p:style>
-      </p:cxnSp>
-      <p:cxnSp>
-        <p:nvCxnSpPr>
           <p:cNvPr id="302" name="Straight Arrow Connector 301">
             <a:extLst>
               <a:ext uri="{FF2B5EF4-FFF2-40B4-BE49-F238E27FC236}">
@@ -6343,8 +6230,8 @@
         </p:nvCxnSpPr>
         <p:spPr>
           <a:xfrm>
-            <a:off x="9506511" y="2183766"/>
-            <a:ext cx="371551" cy="1180454"/>
+            <a:off x="9638181" y="2183766"/>
+            <a:ext cx="239881" cy="1341384"/>
           </a:xfrm>
           <a:prstGeom prst="straightConnector1">
             <a:avLst/>
@@ -6379,15 +6266,15 @@
           </p:cNvPr>
           <p:cNvCxnSpPr>
             <a:cxnSpLocks/>
-            <a:stCxn id="4" idx="3"/>
+            <a:stCxn id="86" idx="3"/>
             <a:endCxn id="5" idx="1"/>
           </p:cNvCxnSpPr>
           <p:nvPr/>
         </p:nvCxnSpPr>
         <p:spPr>
-          <a:xfrm>
-            <a:off x="4102299" y="2365677"/>
-            <a:ext cx="152821" cy="1240502"/>
+          <a:xfrm flipV="1">
+            <a:off x="4102299" y="1710996"/>
+            <a:ext cx="189936" cy="1367"/>
           </a:xfrm>
           <a:prstGeom prst="straightConnector1">
             <a:avLst/>
@@ -6425,7 +6312,7 @@
         </p:nvSpPr>
         <p:spPr>
           <a:xfrm>
-            <a:off x="10955330" y="3307670"/>
+            <a:off x="10955330" y="3468600"/>
             <a:ext cx="1128924" cy="594410"/>
           </a:xfrm>
           <a:prstGeom prst="flowChartDocument">
@@ -6491,8 +6378,8 @@
         </p:nvCxnSpPr>
         <p:spPr>
           <a:xfrm>
-            <a:off x="8751673" y="4393498"/>
-            <a:ext cx="1771547" cy="754698"/>
+            <a:off x="8751673" y="4554428"/>
+            <a:ext cx="1771547" cy="593768"/>
           </a:xfrm>
           <a:prstGeom prst="straightConnector1">
             <a:avLst/>
@@ -6602,6 +6489,807 @@
       </p:sp>
       <p:sp>
         <p:nvSpPr>
+          <p:cNvPr id="111" name="TextBox 110">
+            <a:extLst>
+              <a:ext uri="{FF2B5EF4-FFF2-40B4-BE49-F238E27FC236}">
+                <a16:creationId xmlns:a16="http://schemas.microsoft.com/office/drawing/2014/main" id="{5AA32436-C7F1-49F9-722E-B1B0DD1593A1}"/>
+              </a:ext>
+            </a:extLst>
+          </p:cNvPr>
+          <p:cNvSpPr txBox="1"/>
+          <p:nvPr/>
+        </p:nvSpPr>
+        <p:spPr>
+          <a:xfrm>
+            <a:off x="5546197" y="4123100"/>
+            <a:ext cx="1919038" cy="246221"/>
+          </a:xfrm>
+          <a:prstGeom prst="rect">
+            <a:avLst/>
+          </a:prstGeom>
+          <a:solidFill>
+            <a:schemeClr val="bg1"/>
+          </a:solidFill>
+          <a:ln>
+            <a:solidFill>
+              <a:schemeClr val="accent1"/>
+            </a:solidFill>
+          </a:ln>
+        </p:spPr>
+        <p:txBody>
+          <a:bodyPr wrap="square" rtlCol="0">
+            <a:spAutoFit/>
+          </a:bodyPr>
+          <a:lstStyle/>
+          <a:p>
+            <a:r>
+              <a:rPr lang="en-US" sz="1000" i="1" dirty="0"/>
+              <a:t>/Code and Control Files</a:t>
+            </a:r>
+          </a:p>
+        </p:txBody>
+      </p:sp>
+      <p:sp>
+        <p:nvSpPr>
+          <p:cNvPr id="112" name="TextBox 111">
+            <a:extLst>
+              <a:ext uri="{FF2B5EF4-FFF2-40B4-BE49-F238E27FC236}">
+                <a16:creationId xmlns:a16="http://schemas.microsoft.com/office/drawing/2014/main" id="{03B8B1CA-B3A1-41A9-DD57-B0DE3DC38C33}"/>
+              </a:ext>
+            </a:extLst>
+          </p:cNvPr>
+          <p:cNvSpPr txBox="1"/>
+          <p:nvPr/>
+        </p:nvSpPr>
+        <p:spPr>
+          <a:xfrm>
+            <a:off x="8912165" y="4015487"/>
+            <a:ext cx="1919038" cy="246221"/>
+          </a:xfrm>
+          <a:prstGeom prst="rect">
+            <a:avLst/>
+          </a:prstGeom>
+          <a:solidFill>
+            <a:schemeClr val="bg1"/>
+          </a:solidFill>
+          <a:ln>
+            <a:solidFill>
+              <a:schemeClr val="accent1"/>
+            </a:solidFill>
+          </a:ln>
+        </p:spPr>
+        <p:txBody>
+          <a:bodyPr wrap="square" rtlCol="0">
+            <a:spAutoFit/>
+          </a:bodyPr>
+          <a:lstStyle/>
+          <a:p>
+            <a:r>
+              <a:rPr lang="en-US" sz="1000" i="1" dirty="0"/>
+              <a:t>/Code and Control Files</a:t>
+            </a:r>
+          </a:p>
+        </p:txBody>
+      </p:sp>
+      <p:sp>
+        <p:nvSpPr>
+          <p:cNvPr id="113" name="TextBox 112">
+            <a:extLst>
+              <a:ext uri="{FF2B5EF4-FFF2-40B4-BE49-F238E27FC236}">
+                <a16:creationId xmlns:a16="http://schemas.microsoft.com/office/drawing/2014/main" id="{AC8995C8-30F0-8D55-C9C3-80D5EBA6ADAB}"/>
+              </a:ext>
+            </a:extLst>
+          </p:cNvPr>
+          <p:cNvSpPr txBox="1"/>
+          <p:nvPr/>
+        </p:nvSpPr>
+        <p:spPr>
+          <a:xfrm>
+            <a:off x="7630526" y="5522681"/>
+            <a:ext cx="1185813" cy="246221"/>
+          </a:xfrm>
+          <a:prstGeom prst="rect">
+            <a:avLst/>
+          </a:prstGeom>
+          <a:solidFill>
+            <a:schemeClr val="bg1"/>
+          </a:solidFill>
+          <a:ln>
+            <a:solidFill>
+              <a:schemeClr val="accent1"/>
+            </a:solidFill>
+          </a:ln>
+        </p:spPr>
+        <p:txBody>
+          <a:bodyPr wrap="square" rtlCol="0">
+            <a:spAutoFit/>
+          </a:bodyPr>
+          <a:lstStyle/>
+          <a:p>
+            <a:r>
+              <a:rPr lang="en-US" sz="1000" i="1" dirty="0"/>
+              <a:t>/Program outputs</a:t>
+            </a:r>
+          </a:p>
+        </p:txBody>
+      </p:sp>
+      <p:sp>
+        <p:nvSpPr>
+          <p:cNvPr id="114" name="TextBox 113">
+            <a:extLst>
+              <a:ext uri="{FF2B5EF4-FFF2-40B4-BE49-F238E27FC236}">
+                <a16:creationId xmlns:a16="http://schemas.microsoft.com/office/drawing/2014/main" id="{FF30B7D7-E243-24D7-CEBF-2302835C64F6}"/>
+              </a:ext>
+            </a:extLst>
+          </p:cNvPr>
+          <p:cNvSpPr txBox="1"/>
+          <p:nvPr/>
+        </p:nvSpPr>
+        <p:spPr>
+          <a:xfrm>
+            <a:off x="10955329" y="4059346"/>
+            <a:ext cx="1178945" cy="246221"/>
+          </a:xfrm>
+          <a:prstGeom prst="rect">
+            <a:avLst/>
+          </a:prstGeom>
+          <a:solidFill>
+            <a:schemeClr val="bg1"/>
+          </a:solidFill>
+          <a:ln>
+            <a:solidFill>
+              <a:schemeClr val="accent1"/>
+            </a:solidFill>
+          </a:ln>
+        </p:spPr>
+        <p:txBody>
+          <a:bodyPr wrap="square" rtlCol="0">
+            <a:spAutoFit/>
+          </a:bodyPr>
+          <a:lstStyle/>
+          <a:p>
+            <a:r>
+              <a:rPr lang="en-US" sz="1000" i="1" dirty="0"/>
+              <a:t>/Program outputs</a:t>
+            </a:r>
+          </a:p>
+        </p:txBody>
+      </p:sp>
+      <p:sp>
+        <p:nvSpPr>
+          <p:cNvPr id="115" name="TextBox 114">
+            <a:extLst>
+              <a:ext uri="{FF2B5EF4-FFF2-40B4-BE49-F238E27FC236}">
+                <a16:creationId xmlns:a16="http://schemas.microsoft.com/office/drawing/2014/main" id="{C1075631-6A00-92AB-0E51-615B0B2DBE08}"/>
+              </a:ext>
+            </a:extLst>
+          </p:cNvPr>
+          <p:cNvSpPr txBox="1"/>
+          <p:nvPr/>
+        </p:nvSpPr>
+        <p:spPr>
+          <a:xfrm>
+            <a:off x="8693548" y="2186047"/>
+            <a:ext cx="1884948" cy="246221"/>
+          </a:xfrm>
+          <a:prstGeom prst="rect">
+            <a:avLst/>
+          </a:prstGeom>
+          <a:solidFill>
+            <a:schemeClr val="bg1"/>
+          </a:solidFill>
+          <a:ln>
+            <a:solidFill>
+              <a:schemeClr val="accent1"/>
+            </a:solidFill>
+          </a:ln>
+        </p:spPr>
+        <p:txBody>
+          <a:bodyPr wrap="square" rtlCol="0">
+            <a:spAutoFit/>
+          </a:bodyPr>
+          <a:lstStyle/>
+          <a:p>
+            <a:r>
+              <a:rPr lang="en-US" sz="1000" i="1" dirty="0"/>
+              <a:t>/Code and Control Files</a:t>
+            </a:r>
+          </a:p>
+        </p:txBody>
+      </p:sp>
+      <p:sp>
+        <p:nvSpPr>
+          <p:cNvPr id="116" name="TextBox 115">
+            <a:extLst>
+              <a:ext uri="{FF2B5EF4-FFF2-40B4-BE49-F238E27FC236}">
+                <a16:creationId xmlns:a16="http://schemas.microsoft.com/office/drawing/2014/main" id="{25DAE204-D228-86DF-09ED-4A202CD9C9B0}"/>
+              </a:ext>
+            </a:extLst>
+          </p:cNvPr>
+          <p:cNvSpPr txBox="1"/>
+          <p:nvPr/>
+        </p:nvSpPr>
+        <p:spPr>
+          <a:xfrm>
+            <a:off x="6914212" y="2711734"/>
+            <a:ext cx="1645187" cy="246221"/>
+          </a:xfrm>
+          <a:prstGeom prst="rect">
+            <a:avLst/>
+          </a:prstGeom>
+          <a:solidFill>
+            <a:schemeClr val="bg1"/>
+          </a:solidFill>
+          <a:ln>
+            <a:solidFill>
+              <a:schemeClr val="accent1"/>
+            </a:solidFill>
+          </a:ln>
+        </p:spPr>
+        <p:txBody>
+          <a:bodyPr wrap="square" rtlCol="0">
+            <a:spAutoFit/>
+          </a:bodyPr>
+          <a:lstStyle/>
+          <a:p>
+            <a:r>
+              <a:rPr lang="en-US" sz="1000" i="1" dirty="0"/>
+              <a:t>/Code and Control Files</a:t>
+            </a:r>
+          </a:p>
+        </p:txBody>
+      </p:sp>
+      <p:sp>
+        <p:nvSpPr>
+          <p:cNvPr id="125" name="Flowchart: Document 124">
+            <a:extLst>
+              <a:ext uri="{FF2B5EF4-FFF2-40B4-BE49-F238E27FC236}">
+                <a16:creationId xmlns:a16="http://schemas.microsoft.com/office/drawing/2014/main" id="{2962E0F7-3F75-DB5F-BEF9-2568734011B7}"/>
+              </a:ext>
+            </a:extLst>
+          </p:cNvPr>
+          <p:cNvSpPr/>
+          <p:nvPr/>
+        </p:nvSpPr>
+        <p:spPr>
+          <a:xfrm>
+            <a:off x="4327416" y="4871036"/>
+            <a:ext cx="1128924" cy="594410"/>
+          </a:xfrm>
+          <a:prstGeom prst="flowChartDocument">
+            <a:avLst/>
+          </a:prstGeom>
+          <a:solidFill>
+            <a:schemeClr val="tx1">
+              <a:lumMod val="60000"/>
+              <a:lumOff val="40000"/>
+            </a:schemeClr>
+          </a:solidFill>
+          <a:scene3d>
+            <a:camera prst="orthographicFront"/>
+            <a:lightRig rig="threePt" dir="tl"/>
+          </a:scene3d>
+          <a:sp3d/>
+        </p:spPr>
+        <p:style>
+          <a:lnRef idx="1">
+            <a:schemeClr val="accent1"/>
+          </a:lnRef>
+          <a:fillRef idx="3">
+            <a:schemeClr val="accent1"/>
+          </a:fillRef>
+          <a:effectRef idx="2">
+            <a:schemeClr val="accent1"/>
+          </a:effectRef>
+          <a:fontRef idx="minor">
+            <a:schemeClr val="lt1"/>
+          </a:fontRef>
+        </p:style>
+        <p:txBody>
+          <a:bodyPr rtlCol="0" anchor="ctr"/>
+          <a:lstStyle/>
+          <a:p>
+            <a:pPr algn="ctr"/>
+            <a:r>
+              <a:rPr lang="en-US" sz="1200" dirty="0"/>
+              <a:t>Exchange Rate (Birr/USD)</a:t>
+            </a:r>
+          </a:p>
+        </p:txBody>
+      </p:sp>
+      <p:sp>
+        <p:nvSpPr>
+          <p:cNvPr id="136" name="TextBox 135">
+            <a:extLst>
+              <a:ext uri="{FF2B5EF4-FFF2-40B4-BE49-F238E27FC236}">
+                <a16:creationId xmlns:a16="http://schemas.microsoft.com/office/drawing/2014/main" id="{84F042D3-C98A-2501-5942-3EF92B081743}"/>
+              </a:ext>
+            </a:extLst>
+          </p:cNvPr>
+          <p:cNvSpPr txBox="1"/>
+          <p:nvPr/>
+        </p:nvSpPr>
+        <p:spPr>
+          <a:xfrm>
+            <a:off x="4327416" y="5461521"/>
+            <a:ext cx="1128924" cy="553998"/>
+          </a:xfrm>
+          <a:prstGeom prst="rect">
+            <a:avLst/>
+          </a:prstGeom>
+          <a:solidFill>
+            <a:schemeClr val="bg1"/>
+          </a:solidFill>
+          <a:ln>
+            <a:solidFill>
+              <a:schemeClr val="accent1"/>
+            </a:solidFill>
+          </a:ln>
+        </p:spPr>
+        <p:txBody>
+          <a:bodyPr wrap="square" rtlCol="0">
+            <a:spAutoFit/>
+          </a:bodyPr>
+          <a:lstStyle/>
+          <a:p>
+            <a:r>
+              <a:rPr lang="en-US" sz="1000" i="1" dirty="0"/>
+              <a:t>/Data/</a:t>
+            </a:r>
+            <a:r>
+              <a:rPr lang="en-US" sz="1000" i="1" dirty="0" err="1"/>
+              <a:t>worldbank</a:t>
+            </a:r>
+            <a:endParaRPr lang="en-US" sz="1000" i="1" dirty="0"/>
+          </a:p>
+          <a:p>
+            <a:r>
+              <a:rPr lang="en-US" sz="1000" i="1" dirty="0"/>
+              <a:t>_inflation</a:t>
+            </a:r>
+          </a:p>
+          <a:p>
+            <a:r>
+              <a:rPr lang="en-US" sz="1000" i="1" dirty="0"/>
+              <a:t>_</a:t>
+            </a:r>
+            <a:r>
+              <a:rPr lang="en-US" sz="1000" i="1" dirty="0" err="1"/>
+              <a:t>exchangerate</a:t>
+            </a:r>
+            <a:r>
+              <a:rPr lang="en-US" sz="1000" i="1" dirty="0"/>
+              <a:t>/</a:t>
+            </a:r>
+          </a:p>
+        </p:txBody>
+      </p:sp>
+      <p:sp>
+        <p:nvSpPr>
+          <p:cNvPr id="140" name="TextBox 139">
+            <a:extLst>
+              <a:ext uri="{FF2B5EF4-FFF2-40B4-BE49-F238E27FC236}">
+                <a16:creationId xmlns:a16="http://schemas.microsoft.com/office/drawing/2014/main" id="{679F3EFD-2E04-C3D2-1389-1D401813B18E}"/>
+              </a:ext>
+            </a:extLst>
+          </p:cNvPr>
+          <p:cNvSpPr txBox="1"/>
+          <p:nvPr/>
+        </p:nvSpPr>
+        <p:spPr>
+          <a:xfrm>
+            <a:off x="2217351" y="1151384"/>
+            <a:ext cx="1884948" cy="246221"/>
+          </a:xfrm>
+          <a:prstGeom prst="rect">
+            <a:avLst/>
+          </a:prstGeom>
+          <a:solidFill>
+            <a:schemeClr val="bg1"/>
+          </a:solidFill>
+          <a:ln>
+            <a:solidFill>
+              <a:schemeClr val="accent1"/>
+            </a:solidFill>
+          </a:ln>
+        </p:spPr>
+        <p:txBody>
+          <a:bodyPr wrap="square" rtlCol="0">
+            <a:spAutoFit/>
+          </a:bodyPr>
+          <a:lstStyle/>
+          <a:p>
+            <a:r>
+              <a:rPr lang="en-US" sz="1000" i="1" dirty="0"/>
+              <a:t>&lt;base folder&gt;</a:t>
+            </a:r>
+          </a:p>
+        </p:txBody>
+      </p:sp>
+      <p:cxnSp>
+        <p:nvCxnSpPr>
+          <p:cNvPr id="43" name="Straight Arrow Connector 42">
+            <a:extLst>
+              <a:ext uri="{FF2B5EF4-FFF2-40B4-BE49-F238E27FC236}">
+                <a16:creationId xmlns:a16="http://schemas.microsoft.com/office/drawing/2014/main" id="{CBEF9819-E358-40A2-0AE1-2225A162DEDF}"/>
+              </a:ext>
+            </a:extLst>
+          </p:cNvPr>
+          <p:cNvCxnSpPr>
+            <a:cxnSpLocks/>
+            <a:stCxn id="4" idx="3"/>
+            <a:endCxn id="40" idx="1"/>
+          </p:cNvCxnSpPr>
+          <p:nvPr/>
+        </p:nvCxnSpPr>
+        <p:spPr>
+          <a:xfrm flipV="1">
+            <a:off x="4102299" y="2364496"/>
+            <a:ext cx="189936" cy="1181"/>
+          </a:xfrm>
+          <a:prstGeom prst="straightConnector1">
+            <a:avLst/>
+          </a:prstGeom>
+          <a:ln w="12700">
+            <a:tailEnd type="triangle"/>
+          </a:ln>
+        </p:spPr>
+        <p:style>
+          <a:lnRef idx="2">
+            <a:schemeClr val="accent1"/>
+          </a:lnRef>
+          <a:fillRef idx="0">
+            <a:schemeClr val="accent1"/>
+          </a:fillRef>
+          <a:effectRef idx="1">
+            <a:schemeClr val="accent1"/>
+          </a:effectRef>
+          <a:fontRef idx="minor">
+            <a:schemeClr val="tx1"/>
+          </a:fontRef>
+        </p:style>
+      </p:cxnSp>
+      <p:cxnSp>
+        <p:nvCxnSpPr>
+          <p:cNvPr id="48" name="Straight Arrow Connector 47">
+            <a:extLst>
+              <a:ext uri="{FF2B5EF4-FFF2-40B4-BE49-F238E27FC236}">
+                <a16:creationId xmlns:a16="http://schemas.microsoft.com/office/drawing/2014/main" id="{EB9C8FF7-96F4-95CA-D8EE-5FCF8722DDE3}"/>
+              </a:ext>
+            </a:extLst>
+          </p:cNvPr>
+          <p:cNvCxnSpPr>
+            <a:cxnSpLocks/>
+            <a:stCxn id="85" idx="3"/>
+            <a:endCxn id="42" idx="1"/>
+          </p:cNvCxnSpPr>
+          <p:nvPr/>
+        </p:nvCxnSpPr>
+        <p:spPr>
+          <a:xfrm flipV="1">
+            <a:off x="4102299" y="3034464"/>
+            <a:ext cx="184409" cy="1"/>
+          </a:xfrm>
+          <a:prstGeom prst="straightConnector1">
+            <a:avLst/>
+          </a:prstGeom>
+          <a:ln w="12700">
+            <a:tailEnd type="triangle"/>
+          </a:ln>
+        </p:spPr>
+        <p:style>
+          <a:lnRef idx="2">
+            <a:schemeClr val="accent1"/>
+          </a:lnRef>
+          <a:fillRef idx="0">
+            <a:schemeClr val="accent1"/>
+          </a:fillRef>
+          <a:effectRef idx="1">
+            <a:schemeClr val="accent1"/>
+          </a:effectRef>
+          <a:fontRef idx="minor">
+            <a:schemeClr val="tx1"/>
+          </a:fontRef>
+        </p:style>
+      </p:cxnSp>
+      <p:sp>
+        <p:nvSpPr>
+          <p:cNvPr id="5" name="Flowchart: Multidocument 4">
+            <a:extLst>
+              <a:ext uri="{FF2B5EF4-FFF2-40B4-BE49-F238E27FC236}">
+                <a16:creationId xmlns:a16="http://schemas.microsoft.com/office/drawing/2014/main" id="{954D8599-836F-01DB-27C8-F595804FA5B8}"/>
+              </a:ext>
+            </a:extLst>
+          </p:cNvPr>
+          <p:cNvSpPr/>
+          <p:nvPr/>
+        </p:nvSpPr>
+        <p:spPr>
+          <a:xfrm>
+            <a:off x="4292235" y="1397265"/>
+            <a:ext cx="1091202" cy="627462"/>
+          </a:xfrm>
+          <a:prstGeom prst="flowChartMultidocument">
+            <a:avLst/>
+          </a:prstGeom>
+          <a:solidFill>
+            <a:schemeClr val="tx1">
+              <a:lumMod val="60000"/>
+              <a:lumOff val="40000"/>
+            </a:schemeClr>
+          </a:solidFill>
+          <a:scene3d>
+            <a:camera prst="orthographicFront"/>
+            <a:lightRig rig="threePt" dir="tl"/>
+          </a:scene3d>
+          <a:sp3d/>
+        </p:spPr>
+        <p:style>
+          <a:lnRef idx="1">
+            <a:schemeClr val="accent1"/>
+          </a:lnRef>
+          <a:fillRef idx="3">
+            <a:schemeClr val="accent1"/>
+          </a:fillRef>
+          <a:effectRef idx="2">
+            <a:schemeClr val="accent1"/>
+          </a:effectRef>
+          <a:fontRef idx="minor">
+            <a:schemeClr val="lt1"/>
+          </a:fontRef>
+        </p:style>
+        <p:txBody>
+          <a:bodyPr rtlCol="0" anchor="ctr"/>
+          <a:lstStyle/>
+          <a:p>
+            <a:pPr algn="ctr"/>
+            <a:r>
+              <a:rPr lang="en-US" sz="1200" dirty="0" err="1"/>
+              <a:t>ahle</a:t>
+            </a:r>
+            <a:r>
+              <a:rPr lang="en-US" sz="1200" dirty="0"/>
+              <a:t>_ &lt;</a:t>
+            </a:r>
+            <a:r>
+              <a:rPr lang="en-US" sz="1200" i="1" dirty="0"/>
+              <a:t>scenario&gt; </a:t>
+            </a:r>
+            <a:r>
+              <a:rPr lang="en-US" sz="1200" dirty="0"/>
+              <a:t>.csv</a:t>
+            </a:r>
+          </a:p>
+        </p:txBody>
+      </p:sp>
+      <p:sp>
+        <p:nvSpPr>
+          <p:cNvPr id="40" name="Flowchart: Multidocument 39">
+            <a:extLst>
+              <a:ext uri="{FF2B5EF4-FFF2-40B4-BE49-F238E27FC236}">
+                <a16:creationId xmlns:a16="http://schemas.microsoft.com/office/drawing/2014/main" id="{85A1F918-7D79-F8C9-4B35-27BA397E54BF}"/>
+              </a:ext>
+            </a:extLst>
+          </p:cNvPr>
+          <p:cNvSpPr/>
+          <p:nvPr/>
+        </p:nvSpPr>
+        <p:spPr>
+          <a:xfrm>
+            <a:off x="4292235" y="2050765"/>
+            <a:ext cx="1091202" cy="627462"/>
+          </a:xfrm>
+          <a:prstGeom prst="flowChartMultidocument">
+            <a:avLst/>
+          </a:prstGeom>
+          <a:solidFill>
+            <a:schemeClr val="tx1">
+              <a:lumMod val="60000"/>
+              <a:lumOff val="40000"/>
+            </a:schemeClr>
+          </a:solidFill>
+          <a:scene3d>
+            <a:camera prst="orthographicFront"/>
+            <a:lightRig rig="threePt" dir="tl"/>
+          </a:scene3d>
+          <a:sp3d/>
+        </p:spPr>
+        <p:style>
+          <a:lnRef idx="1">
+            <a:schemeClr val="accent1"/>
+          </a:lnRef>
+          <a:fillRef idx="3">
+            <a:schemeClr val="accent1"/>
+          </a:fillRef>
+          <a:effectRef idx="2">
+            <a:schemeClr val="accent1"/>
+          </a:effectRef>
+          <a:fontRef idx="minor">
+            <a:schemeClr val="lt1"/>
+          </a:fontRef>
+        </p:style>
+        <p:txBody>
+          <a:bodyPr rtlCol="0" anchor="ctr"/>
+          <a:lstStyle/>
+          <a:p>
+            <a:pPr algn="ctr"/>
+            <a:r>
+              <a:rPr lang="en-US" sz="1200" dirty="0" err="1"/>
+              <a:t>ahle</a:t>
+            </a:r>
+            <a:r>
+              <a:rPr lang="en-US" sz="1200" dirty="0"/>
+              <a:t>_ &lt;</a:t>
+            </a:r>
+            <a:r>
+              <a:rPr lang="en-US" sz="1200" i="1" dirty="0"/>
+              <a:t>scenario&gt; </a:t>
+            </a:r>
+            <a:r>
+              <a:rPr lang="en-US" sz="1200" dirty="0"/>
+              <a:t>.csv</a:t>
+            </a:r>
+          </a:p>
+        </p:txBody>
+      </p:sp>
+      <p:sp>
+        <p:nvSpPr>
+          <p:cNvPr id="42" name="Flowchart: Multidocument 41">
+            <a:extLst>
+              <a:ext uri="{FF2B5EF4-FFF2-40B4-BE49-F238E27FC236}">
+                <a16:creationId xmlns:a16="http://schemas.microsoft.com/office/drawing/2014/main" id="{B00554EF-4624-3E24-DF4A-9ACC4B21C0FD}"/>
+              </a:ext>
+            </a:extLst>
+          </p:cNvPr>
+          <p:cNvSpPr/>
+          <p:nvPr/>
+        </p:nvSpPr>
+        <p:spPr>
+          <a:xfrm>
+            <a:off x="4286708" y="2720733"/>
+            <a:ext cx="1091202" cy="627462"/>
+          </a:xfrm>
+          <a:prstGeom prst="flowChartMultidocument">
+            <a:avLst/>
+          </a:prstGeom>
+          <a:solidFill>
+            <a:schemeClr val="tx1">
+              <a:lumMod val="60000"/>
+              <a:lumOff val="40000"/>
+            </a:schemeClr>
+          </a:solidFill>
+          <a:scene3d>
+            <a:camera prst="orthographicFront"/>
+            <a:lightRig rig="threePt" dir="tl"/>
+          </a:scene3d>
+          <a:sp3d/>
+        </p:spPr>
+        <p:style>
+          <a:lnRef idx="1">
+            <a:schemeClr val="accent1"/>
+          </a:lnRef>
+          <a:fillRef idx="3">
+            <a:schemeClr val="accent1"/>
+          </a:fillRef>
+          <a:effectRef idx="2">
+            <a:schemeClr val="accent1"/>
+          </a:effectRef>
+          <a:fontRef idx="minor">
+            <a:schemeClr val="lt1"/>
+          </a:fontRef>
+        </p:style>
+        <p:txBody>
+          <a:bodyPr rtlCol="0" anchor="ctr"/>
+          <a:lstStyle/>
+          <a:p>
+            <a:pPr algn="ctr"/>
+            <a:r>
+              <a:rPr lang="en-US" sz="1200" dirty="0" err="1"/>
+              <a:t>ahle</a:t>
+            </a:r>
+            <a:r>
+              <a:rPr lang="en-US" sz="1200" dirty="0"/>
+              <a:t>_ &lt;</a:t>
+            </a:r>
+            <a:r>
+              <a:rPr lang="en-US" sz="1200" i="1" dirty="0"/>
+              <a:t>scenario&gt; </a:t>
+            </a:r>
+            <a:r>
+              <a:rPr lang="en-US" sz="1200" dirty="0"/>
+              <a:t>.csv</a:t>
+            </a:r>
+          </a:p>
+        </p:txBody>
+      </p:sp>
+      <p:cxnSp>
+        <p:nvCxnSpPr>
+          <p:cNvPr id="63" name="Straight Arrow Connector 62">
+            <a:extLst>
+              <a:ext uri="{FF2B5EF4-FFF2-40B4-BE49-F238E27FC236}">
+                <a16:creationId xmlns:a16="http://schemas.microsoft.com/office/drawing/2014/main" id="{3B8865A5-3506-A9ED-0168-B6F0981E27D6}"/>
+              </a:ext>
+            </a:extLst>
+          </p:cNvPr>
+          <p:cNvCxnSpPr>
+            <a:cxnSpLocks/>
+            <a:stCxn id="40" idx="3"/>
+            <a:endCxn id="13" idx="1"/>
+          </p:cNvCxnSpPr>
+          <p:nvPr/>
+        </p:nvCxnSpPr>
+        <p:spPr>
+          <a:xfrm>
+            <a:off x="5383437" y="2364496"/>
+            <a:ext cx="168575" cy="1402612"/>
+          </a:xfrm>
+          <a:prstGeom prst="straightConnector1">
+            <a:avLst/>
+          </a:prstGeom>
+          <a:ln w="12700">
+            <a:tailEnd type="triangle"/>
+          </a:ln>
+        </p:spPr>
+        <p:style>
+          <a:lnRef idx="2">
+            <a:schemeClr val="accent1"/>
+          </a:lnRef>
+          <a:fillRef idx="0">
+            <a:schemeClr val="accent1"/>
+          </a:fillRef>
+          <a:effectRef idx="1">
+            <a:schemeClr val="accent1"/>
+          </a:effectRef>
+          <a:fontRef idx="minor">
+            <a:schemeClr val="tx1"/>
+          </a:fontRef>
+        </p:style>
+      </p:cxnSp>
+      <p:cxnSp>
+        <p:nvCxnSpPr>
+          <p:cNvPr id="67" name="Straight Arrow Connector 66">
+            <a:extLst>
+              <a:ext uri="{FF2B5EF4-FFF2-40B4-BE49-F238E27FC236}">
+                <a16:creationId xmlns:a16="http://schemas.microsoft.com/office/drawing/2014/main" id="{067F0BB4-F8EC-1C1B-938B-F49379503D9B}"/>
+              </a:ext>
+            </a:extLst>
+          </p:cNvPr>
+          <p:cNvCxnSpPr>
+            <a:cxnSpLocks/>
+            <a:stCxn id="42" idx="3"/>
+            <a:endCxn id="13" idx="1"/>
+          </p:cNvCxnSpPr>
+          <p:nvPr/>
+        </p:nvCxnSpPr>
+        <p:spPr>
+          <a:xfrm>
+            <a:off x="5377910" y="3034464"/>
+            <a:ext cx="174102" cy="732644"/>
+          </a:xfrm>
+          <a:prstGeom prst="straightConnector1">
+            <a:avLst/>
+          </a:prstGeom>
+          <a:ln w="12700">
+            <a:tailEnd type="triangle"/>
+          </a:ln>
+        </p:spPr>
+        <p:style>
+          <a:lnRef idx="2">
+            <a:schemeClr val="accent1"/>
+          </a:lnRef>
+          <a:fillRef idx="0">
+            <a:schemeClr val="accent1"/>
+          </a:fillRef>
+          <a:effectRef idx="1">
+            <a:schemeClr val="accent1"/>
+          </a:effectRef>
+          <a:fontRef idx="minor">
+            <a:schemeClr val="tx1"/>
+          </a:fontRef>
+        </p:style>
+      </p:cxnSp>
+      <p:sp>
+        <p:nvSpPr>
           <p:cNvPr id="110" name="TextBox 109">
             <a:extLst>
               <a:ext uri="{FF2B5EF4-FFF2-40B4-BE49-F238E27FC236}">
@@ -6614,8 +7302,8 @@
         </p:nvSpPr>
         <p:spPr>
           <a:xfrm>
-            <a:off x="4261580" y="4027551"/>
-            <a:ext cx="1160489" cy="246221"/>
+            <a:off x="5158081" y="1452470"/>
+            <a:ext cx="1440934" cy="400110"/>
           </a:xfrm>
           <a:prstGeom prst="rect">
             <a:avLst/>
@@ -6637,17 +7325,25 @@
           <a:p>
             <a:r>
               <a:rPr lang="en-US" sz="1000" i="1" dirty="0"/>
-              <a:t>/Program outputs</a:t>
-            </a:r>
-          </a:p>
-        </p:txBody>
-      </p:sp>
-      <p:sp>
-        <p:nvSpPr>
-          <p:cNvPr id="111" name="TextBox 110">
+              <a:t>/Program outputs/</a:t>
+            </a:r>
+            <a:r>
+              <a:rPr lang="en-US" sz="1000" i="1" dirty="0" err="1"/>
+              <a:t>ahle</a:t>
+            </a:r>
+            <a:r>
+              <a:rPr lang="en-US" sz="1000" i="1" dirty="0"/>
+              <a:t> SMALL RUMINANTS</a:t>
+            </a:r>
+          </a:p>
+        </p:txBody>
+      </p:sp>
+      <p:sp>
+        <p:nvSpPr>
+          <p:cNvPr id="59" name="TextBox 58">
             <a:extLst>
               <a:ext uri="{FF2B5EF4-FFF2-40B4-BE49-F238E27FC236}">
-                <a16:creationId xmlns:a16="http://schemas.microsoft.com/office/drawing/2014/main" id="{5AA32436-C7F1-49F9-722E-B1B0DD1593A1}"/>
+                <a16:creationId xmlns:a16="http://schemas.microsoft.com/office/drawing/2014/main" id="{7D442A7C-4B16-AACB-0C23-168D8FD3C059}"/>
               </a:ext>
             </a:extLst>
           </p:cNvPr>
@@ -6656,8 +7352,8 @@
         </p:nvSpPr>
         <p:spPr>
           <a:xfrm>
-            <a:off x="5546197" y="3962170"/>
-            <a:ext cx="1919038" cy="246221"/>
+            <a:off x="5158081" y="2097870"/>
+            <a:ext cx="1440934" cy="400110"/>
           </a:xfrm>
           <a:prstGeom prst="rect">
             <a:avLst/>
@@ -6679,17 +7375,25 @@
           <a:p>
             <a:r>
               <a:rPr lang="en-US" sz="1000" i="1" dirty="0"/>
-              <a:t>/Code and Control Files</a:t>
-            </a:r>
-          </a:p>
-        </p:txBody>
-      </p:sp>
-      <p:sp>
-        <p:nvSpPr>
-          <p:cNvPr id="112" name="TextBox 111">
+              <a:t>/Program outputs/</a:t>
+            </a:r>
+            <a:r>
+              <a:rPr lang="en-US" sz="1000" i="1" dirty="0" err="1"/>
+              <a:t>ahle</a:t>
+            </a:r>
+            <a:r>
+              <a:rPr lang="en-US" sz="1000" i="1" dirty="0"/>
+              <a:t> CATTLE</a:t>
+            </a:r>
+          </a:p>
+        </p:txBody>
+      </p:sp>
+      <p:sp>
+        <p:nvSpPr>
+          <p:cNvPr id="60" name="TextBox 59">
             <a:extLst>
               <a:ext uri="{FF2B5EF4-FFF2-40B4-BE49-F238E27FC236}">
-                <a16:creationId xmlns:a16="http://schemas.microsoft.com/office/drawing/2014/main" id="{03B8B1CA-B3A1-41A9-DD57-B0DE3DC38C33}"/>
+                <a16:creationId xmlns:a16="http://schemas.microsoft.com/office/drawing/2014/main" id="{AC9CCC15-05AB-3A6A-B66F-18B3C810F6CB}"/>
               </a:ext>
             </a:extLst>
           </p:cNvPr>
@@ -6698,8 +7402,8 @@
         </p:nvSpPr>
         <p:spPr>
           <a:xfrm>
-            <a:off x="8912165" y="3854557"/>
-            <a:ext cx="1919038" cy="246221"/>
+            <a:off x="5158081" y="2779550"/>
+            <a:ext cx="1440934" cy="400110"/>
           </a:xfrm>
           <a:prstGeom prst="rect">
             <a:avLst/>
@@ -6721,342 +7425,15 @@
           <a:p>
             <a:r>
               <a:rPr lang="en-US" sz="1000" i="1" dirty="0"/>
-              <a:t>/Code and Control Files</a:t>
-            </a:r>
-          </a:p>
-        </p:txBody>
-      </p:sp>
-      <p:sp>
-        <p:nvSpPr>
-          <p:cNvPr id="113" name="TextBox 112">
-            <a:extLst>
-              <a:ext uri="{FF2B5EF4-FFF2-40B4-BE49-F238E27FC236}">
-                <a16:creationId xmlns:a16="http://schemas.microsoft.com/office/drawing/2014/main" id="{AC8995C8-30F0-8D55-C9C3-80D5EBA6ADAB}"/>
-              </a:ext>
-            </a:extLst>
-          </p:cNvPr>
-          <p:cNvSpPr txBox="1"/>
-          <p:nvPr/>
-        </p:nvSpPr>
-        <p:spPr>
-          <a:xfrm>
-            <a:off x="7630526" y="5361751"/>
-            <a:ext cx="1185813" cy="246221"/>
-          </a:xfrm>
-          <a:prstGeom prst="rect">
-            <a:avLst/>
-          </a:prstGeom>
-          <a:solidFill>
-            <a:schemeClr val="bg1"/>
-          </a:solidFill>
-          <a:ln>
-            <a:solidFill>
-              <a:schemeClr val="accent1"/>
-            </a:solidFill>
-          </a:ln>
-        </p:spPr>
-        <p:txBody>
-          <a:bodyPr wrap="square" rtlCol="0">
-            <a:spAutoFit/>
-          </a:bodyPr>
-          <a:lstStyle/>
-          <a:p>
+              <a:t>/Program outputs/</a:t>
+            </a:r>
+            <a:r>
+              <a:rPr lang="en-US" sz="1000" i="1" dirty="0" err="1"/>
+              <a:t>ahle</a:t>
+            </a:r>
             <a:r>
               <a:rPr lang="en-US" sz="1000" i="1" dirty="0"/>
-              <a:t>/Program outputs</a:t>
-            </a:r>
-          </a:p>
-        </p:txBody>
-      </p:sp>
-      <p:sp>
-        <p:nvSpPr>
-          <p:cNvPr id="114" name="TextBox 113">
-            <a:extLst>
-              <a:ext uri="{FF2B5EF4-FFF2-40B4-BE49-F238E27FC236}">
-                <a16:creationId xmlns:a16="http://schemas.microsoft.com/office/drawing/2014/main" id="{FF30B7D7-E243-24D7-CEBF-2302835C64F6}"/>
-              </a:ext>
-            </a:extLst>
-          </p:cNvPr>
-          <p:cNvSpPr txBox="1"/>
-          <p:nvPr/>
-        </p:nvSpPr>
-        <p:spPr>
-          <a:xfrm>
-            <a:off x="10955329" y="3898416"/>
-            <a:ext cx="1178945" cy="246221"/>
-          </a:xfrm>
-          <a:prstGeom prst="rect">
-            <a:avLst/>
-          </a:prstGeom>
-          <a:solidFill>
-            <a:schemeClr val="bg1"/>
-          </a:solidFill>
-          <a:ln>
-            <a:solidFill>
-              <a:schemeClr val="accent1"/>
-            </a:solidFill>
-          </a:ln>
-        </p:spPr>
-        <p:txBody>
-          <a:bodyPr wrap="square" rtlCol="0">
-            <a:spAutoFit/>
-          </a:bodyPr>
-          <a:lstStyle/>
-          <a:p>
-            <a:r>
-              <a:rPr lang="en-US" sz="1000" i="1" dirty="0"/>
-              <a:t>/Program outputs</a:t>
-            </a:r>
-          </a:p>
-        </p:txBody>
-      </p:sp>
-      <p:sp>
-        <p:nvSpPr>
-          <p:cNvPr id="115" name="TextBox 114">
-            <a:extLst>
-              <a:ext uri="{FF2B5EF4-FFF2-40B4-BE49-F238E27FC236}">
-                <a16:creationId xmlns:a16="http://schemas.microsoft.com/office/drawing/2014/main" id="{C1075631-6A00-92AB-0E51-615B0B2DBE08}"/>
-              </a:ext>
-            </a:extLst>
-          </p:cNvPr>
-          <p:cNvSpPr txBox="1"/>
-          <p:nvPr/>
-        </p:nvSpPr>
-        <p:spPr>
-          <a:xfrm>
-            <a:off x="8561878" y="2186047"/>
-            <a:ext cx="1884948" cy="246221"/>
-          </a:xfrm>
-          <a:prstGeom prst="rect">
-            <a:avLst/>
-          </a:prstGeom>
-          <a:solidFill>
-            <a:schemeClr val="bg1"/>
-          </a:solidFill>
-          <a:ln>
-            <a:solidFill>
-              <a:schemeClr val="accent1"/>
-            </a:solidFill>
-          </a:ln>
-        </p:spPr>
-        <p:txBody>
-          <a:bodyPr wrap="square" rtlCol="0">
-            <a:spAutoFit/>
-          </a:bodyPr>
-          <a:lstStyle/>
-          <a:p>
-            <a:r>
-              <a:rPr lang="en-US" sz="1000" i="1" dirty="0"/>
-              <a:t>/Code and Control Files</a:t>
-            </a:r>
-          </a:p>
-        </p:txBody>
-      </p:sp>
-      <p:sp>
-        <p:nvSpPr>
-          <p:cNvPr id="116" name="TextBox 115">
-            <a:extLst>
-              <a:ext uri="{FF2B5EF4-FFF2-40B4-BE49-F238E27FC236}">
-                <a16:creationId xmlns:a16="http://schemas.microsoft.com/office/drawing/2014/main" id="{25DAE204-D228-86DF-09ED-4A202CD9C9B0}"/>
-              </a:ext>
-            </a:extLst>
-          </p:cNvPr>
-          <p:cNvSpPr txBox="1"/>
-          <p:nvPr/>
-        </p:nvSpPr>
-        <p:spPr>
-          <a:xfrm>
-            <a:off x="6643556" y="2711734"/>
-            <a:ext cx="1645187" cy="246221"/>
-          </a:xfrm>
-          <a:prstGeom prst="rect">
-            <a:avLst/>
-          </a:prstGeom>
-          <a:solidFill>
-            <a:schemeClr val="bg1"/>
-          </a:solidFill>
-          <a:ln>
-            <a:solidFill>
-              <a:schemeClr val="accent1"/>
-            </a:solidFill>
-          </a:ln>
-        </p:spPr>
-        <p:txBody>
-          <a:bodyPr wrap="square" rtlCol="0">
-            <a:spAutoFit/>
-          </a:bodyPr>
-          <a:lstStyle/>
-          <a:p>
-            <a:r>
-              <a:rPr lang="en-US" sz="1000" i="1" dirty="0"/>
-              <a:t>/Code and Control Files</a:t>
-            </a:r>
-          </a:p>
-        </p:txBody>
-      </p:sp>
-      <p:sp>
-        <p:nvSpPr>
-          <p:cNvPr id="125" name="Flowchart: Document 124">
-            <a:extLst>
-              <a:ext uri="{FF2B5EF4-FFF2-40B4-BE49-F238E27FC236}">
-                <a16:creationId xmlns:a16="http://schemas.microsoft.com/office/drawing/2014/main" id="{2962E0F7-3F75-DB5F-BEF9-2568734011B7}"/>
-              </a:ext>
-            </a:extLst>
-          </p:cNvPr>
-          <p:cNvSpPr/>
-          <p:nvPr/>
-        </p:nvSpPr>
-        <p:spPr>
-          <a:xfrm>
-            <a:off x="4261581" y="4871036"/>
-            <a:ext cx="1128924" cy="594410"/>
-          </a:xfrm>
-          <a:prstGeom prst="flowChartDocument">
-            <a:avLst/>
-          </a:prstGeom>
-          <a:solidFill>
-            <a:schemeClr val="tx1">
-              <a:lumMod val="60000"/>
-              <a:lumOff val="40000"/>
-            </a:schemeClr>
-          </a:solidFill>
-          <a:scene3d>
-            <a:camera prst="orthographicFront"/>
-            <a:lightRig rig="threePt" dir="tl"/>
-          </a:scene3d>
-          <a:sp3d/>
-        </p:spPr>
-        <p:style>
-          <a:lnRef idx="1">
-            <a:schemeClr val="accent1"/>
-          </a:lnRef>
-          <a:fillRef idx="3">
-            <a:schemeClr val="accent1"/>
-          </a:fillRef>
-          <a:effectRef idx="2">
-            <a:schemeClr val="accent1"/>
-          </a:effectRef>
-          <a:fontRef idx="minor">
-            <a:schemeClr val="lt1"/>
-          </a:fontRef>
-        </p:style>
-        <p:txBody>
-          <a:bodyPr rtlCol="0" anchor="ctr"/>
-          <a:lstStyle/>
-          <a:p>
-            <a:pPr algn="ctr"/>
-            <a:r>
-              <a:rPr lang="en-US" sz="1200" dirty="0"/>
-              <a:t>Exchange Rate (Birr/USD)</a:t>
-            </a:r>
-          </a:p>
-        </p:txBody>
-      </p:sp>
-      <p:sp>
-        <p:nvSpPr>
-          <p:cNvPr id="136" name="TextBox 135">
-            <a:extLst>
-              <a:ext uri="{FF2B5EF4-FFF2-40B4-BE49-F238E27FC236}">
-                <a16:creationId xmlns:a16="http://schemas.microsoft.com/office/drawing/2014/main" id="{84F042D3-C98A-2501-5942-3EF92B081743}"/>
-              </a:ext>
-            </a:extLst>
-          </p:cNvPr>
-          <p:cNvSpPr txBox="1"/>
-          <p:nvPr/>
-        </p:nvSpPr>
-        <p:spPr>
-          <a:xfrm>
-            <a:off x="4261581" y="5461521"/>
-            <a:ext cx="1128924" cy="553998"/>
-          </a:xfrm>
-          <a:prstGeom prst="rect">
-            <a:avLst/>
-          </a:prstGeom>
-          <a:solidFill>
-            <a:schemeClr val="bg1"/>
-          </a:solidFill>
-          <a:ln>
-            <a:solidFill>
-              <a:schemeClr val="accent1"/>
-            </a:solidFill>
-          </a:ln>
-        </p:spPr>
-        <p:txBody>
-          <a:bodyPr wrap="square" rtlCol="0">
-            <a:spAutoFit/>
-          </a:bodyPr>
-          <a:lstStyle/>
-          <a:p>
-            <a:r>
-              <a:rPr lang="en-US" sz="1000" i="1" dirty="0"/>
-              <a:t>/Data/</a:t>
-            </a:r>
-            <a:r>
-              <a:rPr lang="en-US" sz="1000" i="1" dirty="0" err="1"/>
-              <a:t>worldbank</a:t>
-            </a:r>
-            <a:endParaRPr lang="en-US" sz="1000" i="1" dirty="0"/>
-          </a:p>
-          <a:p>
-            <a:r>
-              <a:rPr lang="en-US" sz="1000" i="1" dirty="0"/>
-              <a:t>_inflation</a:t>
-            </a:r>
-          </a:p>
-          <a:p>
-            <a:r>
-              <a:rPr lang="en-US" sz="1000" i="1" dirty="0"/>
-              <a:t>_</a:t>
-            </a:r>
-            <a:r>
-              <a:rPr lang="en-US" sz="1000" i="1" dirty="0" err="1"/>
-              <a:t>exchangerate</a:t>
-            </a:r>
-            <a:r>
-              <a:rPr lang="en-US" sz="1000" i="1" dirty="0"/>
-              <a:t>/</a:t>
-            </a:r>
-          </a:p>
-        </p:txBody>
-      </p:sp>
-      <p:sp>
-        <p:nvSpPr>
-          <p:cNvPr id="140" name="TextBox 139">
-            <a:extLst>
-              <a:ext uri="{FF2B5EF4-FFF2-40B4-BE49-F238E27FC236}">
-                <a16:creationId xmlns:a16="http://schemas.microsoft.com/office/drawing/2014/main" id="{679F3EFD-2E04-C3D2-1389-1D401813B18E}"/>
-              </a:ext>
-            </a:extLst>
-          </p:cNvPr>
-          <p:cNvSpPr txBox="1"/>
-          <p:nvPr/>
-        </p:nvSpPr>
-        <p:spPr>
-          <a:xfrm>
-            <a:off x="2217351" y="1151384"/>
-            <a:ext cx="1884948" cy="246221"/>
-          </a:xfrm>
-          <a:prstGeom prst="rect">
-            <a:avLst/>
-          </a:prstGeom>
-          <a:solidFill>
-            <a:schemeClr val="bg1"/>
-          </a:solidFill>
-          <a:ln>
-            <a:solidFill>
-              <a:schemeClr val="accent1"/>
-            </a:solidFill>
-          </a:ln>
-        </p:spPr>
-        <p:txBody>
-          <a:bodyPr wrap="square" rtlCol="0">
-            <a:spAutoFit/>
-          </a:bodyPr>
-          <a:lstStyle/>
-          <a:p>
-            <a:r>
-              <a:rPr lang="en-US" sz="1000" i="1" dirty="0"/>
-              <a:t>&lt;base folder&gt;</a:t>
+              <a:t> POULTRY</a:t>
             </a:r>
           </a:p>
         </p:txBody>
@@ -9636,6 +10013,21 @@
 </file>
 
 <file path=customXml/item1.xml><?xml version="1.0" encoding="utf-8"?>
+<?mso-contentType ?>
+<FormTemplates xmlns="http://schemas.microsoft.com/sharepoint/v3/contenttype/forms">
+  <Display>DocumentLibraryForm</Display>
+  <Edit>DocumentLibraryForm</Edit>
+  <New>DocumentLibraryForm</New>
+</FormTemplates>
+</file>
+
+<file path=customXml/item2.xml><?xml version="1.0" encoding="utf-8"?>
+<p:properties xmlns:p="http://schemas.microsoft.com/office/2006/metadata/properties" xmlns:xsi="http://www.w3.org/2001/XMLSchema-instance" xmlns:pc="http://schemas.microsoft.com/office/infopath/2007/PartnerControls">
+  <documentManagement/>
+</p:properties>
+</file>
+
+<file path=customXml/item3.xml><?xml version="1.0" encoding="utf-8"?>
 <ct:contentTypeSchema xmlns:ct="http://schemas.microsoft.com/office/2006/metadata/contentType" xmlns:ma="http://schemas.microsoft.com/office/2006/metadata/properties/metaAttributes" ct:_="" ma:_="" ma:contentTypeName="Document" ma:contentTypeID="0x01010077CCB0A28C1DC146B32B4CB950B02E5C" ma:contentTypeVersion="9" ma:contentTypeDescription="Create a new document." ma:contentTypeScope="" ma:versionID="b75bfb2a159bd61f88d6e57f3a13c4a6">
   <xsd:schema xmlns:xsd="http://www.w3.org/2001/XMLSchema" xmlns:xs="http://www.w3.org/2001/XMLSchema" xmlns:p="http://schemas.microsoft.com/office/2006/metadata/properties" xmlns:ns2="792ce9f2-e721-4652-96c5-919719c7bd01" targetNamespace="http://schemas.microsoft.com/office/2006/metadata/properties" ma:root="true" ma:fieldsID="089583b4c9b41bf0ab34ebee47c7108f" ns2:_="">
     <xsd:import namespace="792ce9f2-e721-4652-96c5-919719c7bd01"/>
@@ -9813,35 +10205,10 @@
 </ct:contentTypeSchema>
 </file>
 
-<file path=customXml/item2.xml><?xml version="1.0" encoding="utf-8"?>
-<p:properties xmlns:p="http://schemas.microsoft.com/office/2006/metadata/properties" xmlns:xsi="http://www.w3.org/2001/XMLSchema-instance" xmlns:pc="http://schemas.microsoft.com/office/infopath/2007/PartnerControls">
-  <documentManagement/>
-</p:properties>
-</file>
-
-<file path=customXml/item3.xml><?xml version="1.0" encoding="utf-8"?>
-<?mso-contentType ?>
-<FormTemplates xmlns="http://schemas.microsoft.com/sharepoint/v3/contenttype/forms">
-  <Display>DocumentLibraryForm</Display>
-  <Edit>DocumentLibraryForm</Edit>
-  <New>DocumentLibraryForm</New>
-</FormTemplates>
-</file>
-
 <file path=customXml/itemProps1.xml><?xml version="1.0" encoding="utf-8"?>
-<ds:datastoreItem xmlns:ds="http://schemas.openxmlformats.org/officeDocument/2006/customXml" ds:itemID="{02E03F95-8423-4C85-A206-69DB857DD311}">
+<ds:datastoreItem xmlns:ds="http://schemas.openxmlformats.org/officeDocument/2006/customXml" ds:itemID="{E1CA07E0-5768-4132-BC69-D373E4A1EC03}">
   <ds:schemaRefs>
-    <ds:schemaRef ds:uri="http://schemas.microsoft.com/office/2006/metadata/contentType"/>
-    <ds:schemaRef ds:uri="http://schemas.microsoft.com/office/2006/metadata/properties/metaAttributes"/>
-    <ds:schemaRef ds:uri="http://www.w3.org/2001/XMLSchema"/>
-    <ds:schemaRef ds:uri="http://schemas.microsoft.com/office/2006/metadata/properties"/>
-    <ds:schemaRef ds:uri="792ce9f2-e721-4652-96c5-919719c7bd01"/>
-    <ds:schemaRef ds:uri="http://schemas.microsoft.com/office/2006/documentManagement/types"/>
-    <ds:schemaRef ds:uri="http://schemas.microsoft.com/office/infopath/2007/PartnerControls"/>
-    <ds:schemaRef ds:uri="http://schemas.openxmlformats.org/package/2006/metadata/core-properties"/>
-    <ds:schemaRef ds:uri="http://purl.org/dc/elements/1.1/"/>
-    <ds:schemaRef ds:uri="http://purl.org/dc/terms/"/>
-    <ds:schemaRef ds:uri="http://schemas.microsoft.com/internal/obd"/>
+    <ds:schemaRef ds:uri="http://schemas.microsoft.com/sharepoint/v3/contenttype/forms"/>
   </ds:schemaRefs>
 </ds:datastoreItem>
 </file>
@@ -9863,9 +10230,19 @@
 </file>
 
 <file path=customXml/itemProps3.xml><?xml version="1.0" encoding="utf-8"?>
-<ds:datastoreItem xmlns:ds="http://schemas.openxmlformats.org/officeDocument/2006/customXml" ds:itemID="{E1CA07E0-5768-4132-BC69-D373E4A1EC03}">
+<ds:datastoreItem xmlns:ds="http://schemas.openxmlformats.org/officeDocument/2006/customXml" ds:itemID="{02E03F95-8423-4C85-A206-69DB857DD311}">
   <ds:schemaRefs>
-    <ds:schemaRef ds:uri="http://schemas.microsoft.com/sharepoint/v3/contenttype/forms"/>
+    <ds:schemaRef ds:uri="http://schemas.microsoft.com/office/2006/metadata/contentType"/>
+    <ds:schemaRef ds:uri="http://schemas.microsoft.com/office/2006/metadata/properties/metaAttributes"/>
+    <ds:schemaRef ds:uri="http://www.w3.org/2001/XMLSchema"/>
+    <ds:schemaRef ds:uri="http://schemas.microsoft.com/office/2006/metadata/properties"/>
+    <ds:schemaRef ds:uri="792ce9f2-e721-4652-96c5-919719c7bd01"/>
+    <ds:schemaRef ds:uri="http://schemas.microsoft.com/office/2006/documentManagement/types"/>
+    <ds:schemaRef ds:uri="http://schemas.microsoft.com/office/infopath/2007/PartnerControls"/>
+    <ds:schemaRef ds:uri="http://schemas.openxmlformats.org/package/2006/metadata/core-properties"/>
+    <ds:schemaRef ds:uri="http://purl.org/dc/elements/1.1/"/>
+    <ds:schemaRef ds:uri="http://purl.org/dc/terms/"/>
+    <ds:schemaRef ds:uri="http://schemas.microsoft.com/internal/obd"/>
   </ds:schemaRefs>
 </ds:datastoreItem>
 </file>
</xml_diff>